<commit_message>
Final Presentation. Final Commit to Repository for Semester.
</commit_message>
<xml_diff>
--- a/Documents/BIORUBEBOT- CS452 Spring 17.pptx
+++ b/Documents/BIORUBEBOT- CS452 Spring 17.pptx
@@ -5,25 +5,26 @@
     <p:sldMasterId id="2147483648" r:id="rId1"/>
   </p:sldMasterIdLst>
   <p:notesMasterIdLst>
-    <p:notesMasterId r:id="rId15"/>
+    <p:notesMasterId r:id="rId16"/>
   </p:notesMasterIdLst>
   <p:handoutMasterIdLst>
-    <p:handoutMasterId r:id="rId16"/>
+    <p:handoutMasterId r:id="rId17"/>
   </p:handoutMasterIdLst>
   <p:sldIdLst>
     <p:sldId id="256" r:id="rId2"/>
     <p:sldId id="340" r:id="rId3"/>
     <p:sldId id="341" r:id="rId4"/>
     <p:sldId id="342" r:id="rId5"/>
-    <p:sldId id="348" r:id="rId6"/>
-    <p:sldId id="352" r:id="rId7"/>
-    <p:sldId id="344" r:id="rId8"/>
-    <p:sldId id="343" r:id="rId9"/>
-    <p:sldId id="345" r:id="rId10"/>
-    <p:sldId id="346" r:id="rId11"/>
-    <p:sldId id="347" r:id="rId12"/>
-    <p:sldId id="353" r:id="rId13"/>
-    <p:sldId id="338" r:id="rId14"/>
+    <p:sldId id="355" r:id="rId6"/>
+    <p:sldId id="348" r:id="rId7"/>
+    <p:sldId id="352" r:id="rId8"/>
+    <p:sldId id="344" r:id="rId9"/>
+    <p:sldId id="343" r:id="rId10"/>
+    <p:sldId id="345" r:id="rId11"/>
+    <p:sldId id="346" r:id="rId12"/>
+    <p:sldId id="347" r:id="rId13"/>
+    <p:sldId id="353" r:id="rId14"/>
+    <p:sldId id="338" r:id="rId15"/>
   </p:sldIdLst>
   <p:sldSz cx="9144000" cy="5143500" type="screen16x9"/>
   <p:notesSz cx="6858000" cy="9144000"/>
@@ -292,7 +293,7 @@
               <a:pPr>
                 <a:defRPr/>
               </a:pPr>
-              <a:t>26/4/2017</a:t>
+              <a:t>27/04/2017</a:t>
             </a:fld>
             <a:endParaRPr lang="en-JM"/>
           </a:p>
@@ -507,7 +508,7 @@
               <a:pPr>
                 <a:defRPr/>
               </a:pPr>
-              <a:t>26/4/2017</a:t>
+              <a:t>27/04/2017</a:t>
             </a:fld>
             <a:endParaRPr lang="en-JM"/>
           </a:p>
@@ -967,7 +968,15 @@
           <a:bodyPr/>
           <a:lstStyle/>
           <a:p>
-            <a:endParaRPr lang="en-US"/>
+            <a:r>
+              <a:rPr lang="en-US" dirty="0"/>
+              <a:t>Show different versions via </a:t>
+            </a:r>
+            <a:r>
+              <a:rPr lang="en-US" dirty="0" err="1"/>
+              <a:t>ipad</a:t>
+            </a:r>
+            <a:endParaRPr lang="en-US" dirty="0"/>
           </a:p>
         </p:txBody>
       </p:sp>
@@ -1003,7 +1012,7 @@
     </p:spTree>
     <p:extLst>
       <p:ext uri="{BB962C8B-B14F-4D97-AF65-F5344CB8AC3E}">
-        <p14:creationId xmlns:p14="http://schemas.microsoft.com/office/powerpoint/2010/main" val="530728576"/>
+        <p14:creationId xmlns:p14="http://schemas.microsoft.com/office/powerpoint/2010/main" val="839595030"/>
       </p:ext>
     </p:extLst>
   </p:cSld>
@@ -1057,15 +1066,7 @@
           <a:bodyPr/>
           <a:lstStyle/>
           <a:p>
-            <a:r>
-              <a:rPr lang="en-US" dirty="0"/>
-              <a:t>Not just advise from us also from</a:t>
-            </a:r>
-            <a:r>
-              <a:rPr lang="en-US" baseline="0" dirty="0"/>
-              <a:t> previous groups</a:t>
-            </a:r>
-            <a:endParaRPr lang="en-US" dirty="0"/>
+            <a:endParaRPr lang="en-US"/>
           </a:p>
         </p:txBody>
       </p:sp>
@@ -1101,7 +1102,7 @@
     </p:spTree>
     <p:extLst>
       <p:ext uri="{BB962C8B-B14F-4D97-AF65-F5344CB8AC3E}">
-        <p14:creationId xmlns:p14="http://schemas.microsoft.com/office/powerpoint/2010/main" val="140712523"/>
+        <p14:creationId xmlns:p14="http://schemas.microsoft.com/office/powerpoint/2010/main" val="530728576"/>
       </p:ext>
     </p:extLst>
   </p:cSld>
@@ -1155,7 +1156,15 @@
           <a:bodyPr/>
           <a:lstStyle/>
           <a:p>
-            <a:endParaRPr lang="en-US"/>
+            <a:r>
+              <a:rPr lang="en-US" dirty="0"/>
+              <a:t>Not just advise from us also from</a:t>
+            </a:r>
+            <a:r>
+              <a:rPr lang="en-US" baseline="0" dirty="0"/>
+              <a:t> previous groups</a:t>
+            </a:r>
+            <a:endParaRPr lang="en-US" dirty="0"/>
           </a:p>
         </p:txBody>
       </p:sp>
@@ -1191,7 +1200,7 @@
     </p:spTree>
     <p:extLst>
       <p:ext uri="{BB962C8B-B14F-4D97-AF65-F5344CB8AC3E}">
-        <p14:creationId xmlns:p14="http://schemas.microsoft.com/office/powerpoint/2010/main" val="2134267210"/>
+        <p14:creationId xmlns:p14="http://schemas.microsoft.com/office/powerpoint/2010/main" val="140712523"/>
       </p:ext>
     </p:extLst>
   </p:cSld>
@@ -1245,7 +1254,7 @@
           <a:bodyPr/>
           <a:lstStyle/>
           <a:p>
-            <a:endParaRPr lang="en-US" dirty="0"/>
+            <a:endParaRPr lang="en-US"/>
           </a:p>
         </p:txBody>
       </p:sp>
@@ -1273,6 +1282,100 @@
                 <a:defRPr/>
               </a:pPr>
               <a:t>13</a:t>
+            </a:fld>
+            <a:endParaRPr lang="en-JM"/>
+          </a:p>
+        </p:txBody>
+      </p:sp>
+    </p:spTree>
+    <p:extLst>
+      <p:ext uri="{BB962C8B-B14F-4D97-AF65-F5344CB8AC3E}">
+        <p14:creationId xmlns:p14="http://schemas.microsoft.com/office/powerpoint/2010/main" val="2134267210"/>
+      </p:ext>
+    </p:extLst>
+  </p:cSld>
+  <p:clrMapOvr>
+    <a:masterClrMapping/>
+  </p:clrMapOvr>
+</p:notes>
+</file>
+
+<file path=ppt/notesSlides/notesSlide14.xml><?xml version="1.0" encoding="utf-8"?>
+<p:notes xmlns:a="http://schemas.openxmlformats.org/drawingml/2006/main" xmlns:r="http://schemas.openxmlformats.org/officeDocument/2006/relationships" xmlns:p="http://schemas.openxmlformats.org/presentationml/2006/main">
+  <p:cSld>
+    <p:spTree>
+      <p:nvGrpSpPr>
+        <p:cNvPr id="1" name=""/>
+        <p:cNvGrpSpPr/>
+        <p:nvPr/>
+      </p:nvGrpSpPr>
+      <p:grpSpPr>
+        <a:xfrm>
+          <a:off x="0" y="0"/>
+          <a:ext cx="0" cy="0"/>
+          <a:chOff x="0" y="0"/>
+          <a:chExt cx="0" cy="0"/>
+        </a:xfrm>
+      </p:grpSpPr>
+      <p:sp>
+        <p:nvSpPr>
+          <p:cNvPr id="2" name="Slide Image Placeholder 1"/>
+          <p:cNvSpPr>
+            <a:spLocks noGrp="1" noRot="1" noChangeAspect="1"/>
+          </p:cNvSpPr>
+          <p:nvPr>
+            <p:ph type="sldImg"/>
+          </p:nvPr>
+        </p:nvSpPr>
+        <p:spPr/>
+      </p:sp>
+      <p:sp>
+        <p:nvSpPr>
+          <p:cNvPr id="3" name="Notes Placeholder 2"/>
+          <p:cNvSpPr>
+            <a:spLocks noGrp="1"/>
+          </p:cNvSpPr>
+          <p:nvPr>
+            <p:ph type="body" idx="1"/>
+          </p:nvPr>
+        </p:nvSpPr>
+        <p:spPr/>
+        <p:txBody>
+          <a:bodyPr/>
+          <a:lstStyle/>
+          <a:p>
+            <a:r>
+              <a:rPr lang="en-US" dirty="0" smtClean="0"/>
+              <a:t>Questions????????????????????????</a:t>
+            </a:r>
+            <a:endParaRPr lang="en-US" dirty="0"/>
+          </a:p>
+        </p:txBody>
+      </p:sp>
+      <p:sp>
+        <p:nvSpPr>
+          <p:cNvPr id="4" name="Slide Number Placeholder 3"/>
+          <p:cNvSpPr>
+            <a:spLocks noGrp="1"/>
+          </p:cNvSpPr>
+          <p:nvPr>
+            <p:ph type="sldNum" sz="quarter" idx="10"/>
+          </p:nvPr>
+        </p:nvSpPr>
+        <p:spPr/>
+        <p:txBody>
+          <a:bodyPr/>
+          <a:lstStyle/>
+          <a:p>
+            <a:pPr>
+              <a:defRPr/>
+            </a:pPr>
+            <a:fld id="{4B464497-61C4-46B0-ACA5-17230456BCD5}" type="slidenum">
+              <a:rPr lang="en-JM"/>
+              <a:pPr>
+                <a:defRPr/>
+              </a:pPr>
+              <a:t>14</a:t>
             </a:fld>
             <a:endParaRPr lang="en-JM"/>
           </a:p>
@@ -1343,6 +1446,16 @@
               <a:rPr lang="en-US" baseline="0" dirty="0"/>
               <a:t> Cline started our whole project off with this statement</a:t>
             </a:r>
+          </a:p>
+          <a:p>
+            <a:r>
+              <a:rPr lang="en-US" baseline="0" dirty="0" err="1"/>
+              <a:t>BioRubebot’s</a:t>
+            </a:r>
+            <a:r>
+              <a:rPr lang="en-US" baseline="0" dirty="0"/>
+              <a:t> targeted audience is children ranging K-12. </a:t>
+            </a:r>
             <a:endParaRPr lang="en-US" dirty="0"/>
           </a:p>
         </p:txBody>
@@ -1459,7 +1572,7 @@
           <a:p>
             <a:r>
               <a:rPr lang="en-US" baseline="0" dirty="0"/>
-              <a:t>Mention fast forward toggled incorrectly, green highlighting was wrong as well</a:t>
+              <a:t>Mention fast forward toggled incorrectly, green highlighting was wrong as well (under performance issue of first bullet point)</a:t>
             </a:r>
           </a:p>
           <a:p>
@@ -1477,20 +1590,17 @@
           <a:p>
             <a:r>
               <a:rPr lang="en-US" baseline="0" dirty="0"/>
-              <a:t>Everybody had to settle in their positions and understand their role</a:t>
+              <a:t>Everybody had to settle in their positions and understand how their roles contributed to the project overall.</a:t>
             </a:r>
           </a:p>
           <a:p>
             <a:r>
               <a:rPr lang="en-US" baseline="0" dirty="0"/>
-              <a:t>-</a:t>
-            </a:r>
-          </a:p>
-          <a:p>
-            <a:r>
-              <a:rPr lang="en-US" baseline="0" dirty="0"/>
-              <a:t>-</a:t>
-            </a:r>
+              <a:t>Mention g-protein did not function correctly in build we received.</a:t>
+            </a:r>
+          </a:p>
+          <a:p>
+            <a:endParaRPr lang="en-US" baseline="0" dirty="0"/>
           </a:p>
         </p:txBody>
       </p:sp>
@@ -1588,6 +1698,12 @@
               <a:rPr lang="en-US" baseline="0" dirty="0"/>
               <a:t> G-Protein fix questions to David, all IPAD questions still defer to Denzel</a:t>
             </a:r>
+          </a:p>
+          <a:p>
+            <a:r>
+              <a:rPr lang="en-US" baseline="0" dirty="0"/>
+              <a:t>Explain last bullet point more in detail. </a:t>
+            </a:r>
             <a:endParaRPr lang="en-US" dirty="0"/>
           </a:p>
         </p:txBody>
@@ -1688,41 +1804,8 @@
             </a:r>
             <a:r>
               <a:rPr lang="en-US" dirty="0"/>
-              <a:t> New prefabs for level 2</a:t>
-            </a:r>
-            <a:r>
-              <a:rPr lang="en-US" baseline="0" dirty="0"/>
-              <a:t> &amp; 3</a:t>
-            </a:r>
-          </a:p>
-          <a:p>
-            <a:r>
-              <a:rPr lang="en-US" baseline="0" dirty="0"/>
-              <a:t>Lisa designed </a:t>
-            </a:r>
-          </a:p>
-          <a:p>
-            <a:r>
-              <a:rPr lang="en-US" baseline="0" dirty="0"/>
-              <a:t>David-  to answer questions about Unity side</a:t>
-            </a:r>
-          </a:p>
-          <a:p>
-            <a:r>
-              <a:rPr lang="en-US" baseline="0" dirty="0"/>
-              <a:t>David </a:t>
-            </a:r>
-            <a:r>
-              <a:rPr lang="mr-IN" baseline="0" dirty="0"/>
-              <a:t>–</a:t>
-            </a:r>
-            <a:r>
-              <a:rPr lang="en-US" baseline="0" dirty="0"/>
-              <a:t> Behavior scripts include collision, movement, tracking, and destroying object on attachment</a:t>
-            </a:r>
-          </a:p>
-          <a:p>
-            <a:endParaRPr lang="en-US" dirty="0"/>
+              <a:t> </a:t>
+            </a:r>
           </a:p>
         </p:txBody>
       </p:sp>
@@ -1758,7 +1841,7 @@
     </p:spTree>
     <p:extLst>
       <p:ext uri="{BB962C8B-B14F-4D97-AF65-F5344CB8AC3E}">
-        <p14:creationId xmlns:p14="http://schemas.microsoft.com/office/powerpoint/2010/main" val="2060532658"/>
+        <p14:creationId xmlns:p14="http://schemas.microsoft.com/office/powerpoint/2010/main" val="1598451488"/>
       </p:ext>
     </p:extLst>
   </p:cSld>
@@ -1814,24 +1897,70 @@
           <a:p>
             <a:r>
               <a:rPr lang="en-US" dirty="0"/>
-              <a:t>Lisa explains creation of prefabs</a:t>
-            </a:r>
-          </a:p>
-          <a:p>
+              <a:t>Denzel </a:t>
+            </a:r>
+            <a:r>
+              <a:rPr lang="mr-IN" dirty="0"/>
+              <a:t>–</a:t>
+            </a:r>
             <a:r>
               <a:rPr lang="en-US" dirty="0"/>
-              <a:t>Daniel explains</a:t>
+              <a:t> </a:t>
+            </a:r>
+            <a:r>
+              <a:rPr lang="en-US" dirty="0" smtClean="0"/>
+              <a:t>	New </a:t>
+            </a:r>
+            <a:r>
+              <a:rPr lang="en-US" dirty="0"/>
+              <a:t>prefabs for level </a:t>
+            </a:r>
+            <a:r>
+              <a:rPr lang="en-US" dirty="0" smtClean="0"/>
+              <a:t>2</a:t>
             </a:r>
             <a:r>
               <a:rPr lang="en-US" baseline="0" dirty="0"/>
-              <a:t> biological processes</a:t>
-            </a:r>
+              <a:t> </a:t>
+            </a:r>
+            <a:endParaRPr lang="en-US" baseline="0" dirty="0" smtClean="0"/>
+          </a:p>
+          <a:p>
+            <a:r>
+              <a:rPr lang="en-US" baseline="0" dirty="0" smtClean="0"/>
+              <a:t>	(Menu)-Removed original single receptor and placed new parts in menu</a:t>
+            </a:r>
+            <a:endParaRPr lang="en-US" baseline="0" dirty="0"/>
           </a:p>
           <a:p>
             <a:r>
               <a:rPr lang="en-US" baseline="0" dirty="0"/>
-              <a:t>Level 3 is a different cell signaling process</a:t>
-            </a:r>
+              <a:t>Lisa designed </a:t>
+            </a:r>
+          </a:p>
+          <a:p>
+            <a:r>
+              <a:rPr lang="en-US" baseline="0" dirty="0" smtClean="0"/>
+              <a:t>David </a:t>
+            </a:r>
+            <a:r>
+              <a:rPr lang="mr-IN" baseline="0" dirty="0"/>
+              <a:t>–</a:t>
+            </a:r>
+            <a:r>
+              <a:rPr lang="en-US" baseline="0" dirty="0"/>
+              <a:t> </a:t>
+            </a:r>
+            <a:r>
+              <a:rPr lang="en-US" baseline="0" dirty="0" smtClean="0"/>
+              <a:t>(Unity) Behavior </a:t>
+            </a:r>
+            <a:r>
+              <a:rPr lang="en-US" baseline="0" dirty="0"/>
+              <a:t>scripts include collision, movement, tracking, and destroying object on attachment</a:t>
+            </a:r>
+          </a:p>
+          <a:p>
             <a:endParaRPr lang="en-US" dirty="0"/>
           </a:p>
         </p:txBody>
@@ -1855,7 +1984,7 @@
               <a:defRPr/>
             </a:pPr>
             <a:fld id="{4B464497-61C4-46B0-ACA5-17230456BCD5}" type="slidenum">
-              <a:rPr lang="en-JM" smtClean="0"/>
+              <a:rPr lang="en-JM"/>
               <a:pPr>
                 <a:defRPr/>
               </a:pPr>
@@ -1868,7 +1997,7 @@
     </p:spTree>
     <p:extLst>
       <p:ext uri="{BB962C8B-B14F-4D97-AF65-F5344CB8AC3E}">
-        <p14:creationId xmlns:p14="http://schemas.microsoft.com/office/powerpoint/2010/main" val="619720087"/>
+        <p14:creationId xmlns:p14="http://schemas.microsoft.com/office/powerpoint/2010/main" val="2060532658"/>
       </p:ext>
     </p:extLst>
   </p:cSld>
@@ -1922,7 +2051,31 @@
           <a:bodyPr/>
           <a:lstStyle/>
           <a:p>
-            <a:endParaRPr lang="en-US"/>
+            <a:r>
+              <a:rPr lang="en-US" dirty="0"/>
+              <a:t>Lisa explains creation of prefabs</a:t>
+            </a:r>
+          </a:p>
+          <a:p>
+            <a:r>
+              <a:rPr lang="en-US" dirty="0"/>
+              <a:t>Daniel explains</a:t>
+            </a:r>
+            <a:r>
+              <a:rPr lang="en-US" baseline="0" dirty="0"/>
+              <a:t> biological processes</a:t>
+            </a:r>
+          </a:p>
+          <a:p>
+            <a:r>
+              <a:rPr lang="en-US" baseline="0" dirty="0"/>
+              <a:t>Level 3 is a different cell signaling </a:t>
+            </a:r>
+            <a:r>
+              <a:rPr lang="en-US" baseline="0" dirty="0" smtClean="0"/>
+              <a:t>process (g-protein)</a:t>
+            </a:r>
+            <a:endParaRPr lang="en-US" dirty="0"/>
           </a:p>
         </p:txBody>
       </p:sp>
@@ -1945,7 +2098,7 @@
               <a:defRPr/>
             </a:pPr>
             <a:fld id="{4B464497-61C4-46B0-ACA5-17230456BCD5}" type="slidenum">
-              <a:rPr lang="en-JM"/>
+              <a:rPr lang="en-JM" smtClean="0"/>
               <a:pPr>
                 <a:defRPr/>
               </a:pPr>
@@ -1958,7 +2111,7 @@
     </p:spTree>
     <p:extLst>
       <p:ext uri="{BB962C8B-B14F-4D97-AF65-F5344CB8AC3E}">
-        <p14:creationId xmlns:p14="http://schemas.microsoft.com/office/powerpoint/2010/main" val="2139516664"/>
+        <p14:creationId xmlns:p14="http://schemas.microsoft.com/office/powerpoint/2010/main" val="619720087"/>
       </p:ext>
     </p:extLst>
   </p:cSld>
@@ -2013,16 +2166,12 @@
           <a:lstStyle/>
           <a:p>
             <a:r>
-              <a:rPr lang="en-US" dirty="0"/>
-              <a:t>Denzel -This is</a:t>
-            </a:r>
-            <a:r>
-              <a:rPr lang="en-US" baseline="0" dirty="0"/>
-              <a:t> what we started with. Start with the broke </a:t>
-            </a:r>
-            <a:r>
-              <a:rPr lang="en-US" baseline="0" dirty="0" err="1"/>
-              <a:t>ipad</a:t>
+              <a:rPr lang="en-US" dirty="0" smtClean="0"/>
+              <a:t>Next slide</a:t>
+            </a:r>
+            <a:r>
+              <a:rPr lang="en-US" baseline="0" dirty="0" smtClean="0"/>
+              <a:t> is demo with errors!</a:t>
             </a:r>
             <a:endParaRPr lang="en-US" dirty="0"/>
           </a:p>
@@ -2060,7 +2209,7 @@
     </p:spTree>
     <p:extLst>
       <p:ext uri="{BB962C8B-B14F-4D97-AF65-F5344CB8AC3E}">
-        <p14:creationId xmlns:p14="http://schemas.microsoft.com/office/powerpoint/2010/main" val="922143915"/>
+        <p14:creationId xmlns:p14="http://schemas.microsoft.com/office/powerpoint/2010/main" val="2139516664"/>
       </p:ext>
     </p:extLst>
   </p:cSld>
@@ -2116,10 +2265,14 @@
           <a:p>
             <a:r>
               <a:rPr lang="en-US" dirty="0"/>
-              <a:t>Show different versions via </a:t>
-            </a:r>
-            <a:r>
-              <a:rPr lang="en-US" dirty="0" err="1"/>
+              <a:t>Denzel -This is</a:t>
+            </a:r>
+            <a:r>
+              <a:rPr lang="en-US" baseline="0" dirty="0"/>
+              <a:t> what we started with. Start with the broke </a:t>
+            </a:r>
+            <a:r>
+              <a:rPr lang="en-US" baseline="0" dirty="0" err="1"/>
               <a:t>ipad</a:t>
             </a:r>
             <a:endParaRPr lang="en-US" dirty="0"/>
@@ -2158,7 +2311,7 @@
     </p:spTree>
     <p:extLst>
       <p:ext uri="{BB962C8B-B14F-4D97-AF65-F5344CB8AC3E}">
-        <p14:creationId xmlns:p14="http://schemas.microsoft.com/office/powerpoint/2010/main" val="839595030"/>
+        <p14:creationId xmlns:p14="http://schemas.microsoft.com/office/powerpoint/2010/main" val="922143915"/>
       </p:ext>
     </p:extLst>
   </p:cSld>
@@ -17245,7 +17398,7 @@
         </p:spPr>
         <p:txBody>
           <a:bodyPr rtlCol="0">
-            <a:normAutofit fontScale="77500" lnSpcReduction="20000"/>
+            <a:normAutofit fontScale="70000" lnSpcReduction="20000"/>
           </a:bodyPr>
           <a:lstStyle/>
           <a:p>
@@ -18092,7 +18245,7 @@
           <a:p>
             <a:r>
               <a:rPr lang="en-US" dirty="0"/>
-              <a:t>Conclusions</a:t>
+              <a:t>Demonstration</a:t>
             </a:r>
           </a:p>
         </p:txBody>
@@ -18107,59 +18260,131 @@
             <p:ph idx="1"/>
           </p:nvPr>
         </p:nvSpPr>
-        <p:spPr>
-          <a:xfrm>
-            <a:off x="457200" y="1028701"/>
-            <a:ext cx="6781800" cy="2000250"/>
-          </a:xfrm>
-        </p:spPr>
+        <p:spPr/>
         <p:txBody>
           <a:bodyPr/>
           <a:lstStyle/>
           <a:p>
             <a:r>
-              <a:rPr lang="en-US" sz="1600" b="1" dirty="0" err="1"/>
-              <a:t>BioRubeBot</a:t>
-            </a:r>
-            <a:r>
               <a:rPr lang="en-US" sz="1600" b="1" dirty="0"/>
-              <a:t> has made great strides</a:t>
+              <a:t>Previous Version:</a:t>
             </a:r>
           </a:p>
           <a:p>
             <a:pPr lvl="1"/>
             <a:r>
-              <a:rPr lang="en-US" sz="1600" dirty="0"/>
-              <a:t>Functionality has been vastly improved</a:t>
+              <a:rPr lang="en-US" dirty="0"/>
+              <a:t>Contained functional level one</a:t>
             </a:r>
           </a:p>
           <a:p>
             <a:pPr lvl="1"/>
             <a:r>
-              <a:rPr lang="en-US" sz="1600" dirty="0"/>
-              <a:t>Refactored code for better efficiency and usability</a:t>
+              <a:rPr lang="en-US" dirty="0"/>
+              <a:t>G-protein did not work correctly</a:t>
             </a:r>
           </a:p>
           <a:p>
             <a:pPr lvl="1"/>
             <a:r>
-              <a:rPr lang="en-US" sz="1600" dirty="0"/>
-              <a:t>Documentation has substantially been improved</a:t>
+              <a:rPr lang="en-US" dirty="0"/>
+              <a:t>Fast forward </a:t>
+            </a:r>
+            <a:r>
+              <a:rPr lang="en-US" dirty="0" smtClean="0"/>
+              <a:t>button </a:t>
+            </a:r>
+            <a:r>
+              <a:rPr lang="en-US" dirty="0"/>
+              <a:t>did not work correctly</a:t>
             </a:r>
           </a:p>
           <a:p>
             <a:pPr lvl="1"/>
             <a:r>
-              <a:rPr lang="en-US" sz="1600" dirty="0"/>
-              <a:t>Staged the project for future groups</a:t>
-            </a:r>
+              <a:rPr lang="en-US" dirty="0"/>
+              <a:t>Very </a:t>
+            </a:r>
+            <a:r>
+              <a:rPr lang="en-US" dirty="0" err="1"/>
+              <a:t>laggy</a:t>
+            </a:r>
+            <a:endParaRPr lang="en-US" dirty="0"/>
+          </a:p>
+          <a:p>
+            <a:r>
+              <a:rPr lang="en-US" sz="1600" b="1" dirty="0"/>
+              <a:t>Latest Version:</a:t>
+            </a:r>
+          </a:p>
+          <a:p>
+            <a:pPr lvl="1"/>
+            <a:r>
+              <a:rPr lang="en-US" dirty="0"/>
+              <a:t>Contains functional level one &amp; two</a:t>
+            </a:r>
+          </a:p>
+          <a:p>
+            <a:pPr lvl="1"/>
+            <a:r>
+              <a:rPr lang="en-US" dirty="0"/>
+              <a:t>Runs smoothly</a:t>
+            </a:r>
+          </a:p>
+          <a:p>
+            <a:pPr lvl="1"/>
+            <a:r>
+              <a:rPr lang="en-US" dirty="0"/>
+              <a:t>All parts function as intended for both levels</a:t>
+            </a:r>
+          </a:p>
+          <a:p>
+            <a:pPr lvl="1"/>
+            <a:r>
+              <a:rPr lang="en-US" dirty="0"/>
+              <a:t>Contains new pre-</a:t>
+            </a:r>
+            <a:r>
+              <a:rPr lang="en-US" dirty="0" err="1"/>
+              <a:t>fabs</a:t>
+            </a:r>
+            <a:r>
+              <a:rPr lang="en-US" dirty="0"/>
+              <a:t> for level three</a:t>
+            </a:r>
+          </a:p>
+          <a:p>
+            <a:pPr lvl="1"/>
+            <a:r>
+              <a:rPr lang="en-US" dirty="0" smtClean="0"/>
+              <a:t>Implemented</a:t>
+            </a:r>
+            <a:r>
+              <a:rPr lang="en-US" dirty="0" smtClean="0"/>
+              <a:t> fixes </a:t>
+            </a:r>
+            <a:r>
+              <a:rPr lang="en-US" dirty="0"/>
+              <a:t>for </a:t>
+            </a:r>
+            <a:r>
+              <a:rPr lang="en-US" dirty="0" err="1"/>
+              <a:t>Ipad</a:t>
+            </a:r>
+            <a:endParaRPr lang="en-US" dirty="0"/>
+          </a:p>
+          <a:p>
+            <a:pPr marL="457200" lvl="1" indent="0">
+              <a:buNone/>
+            </a:pPr>
+            <a:endParaRPr lang="en-US" dirty="0"/>
           </a:p>
         </p:txBody>
       </p:sp>
     </p:spTree>
     <p:extLst>
       <p:ext uri="{BB962C8B-B14F-4D97-AF65-F5344CB8AC3E}">
-        <p14:creationId xmlns:p14="http://schemas.microsoft.com/office/powerpoint/2010/main" val="2212414703"/>
+        <p14:creationId xmlns:p14="http://schemas.microsoft.com/office/powerpoint/2010/main" val="4037059624"/>
       </p:ext>
     </p:extLst>
   </p:cSld>
@@ -18203,7 +18428,7 @@
           <a:p>
             <a:r>
               <a:rPr lang="en-US" dirty="0"/>
-              <a:t>Next steps</a:t>
+              <a:t>Conclusions</a:t>
             </a:r>
           </a:p>
         </p:txBody>
@@ -18218,74 +18443,59 @@
             <p:ph idx="1"/>
           </p:nvPr>
         </p:nvSpPr>
-        <p:spPr/>
+        <p:spPr>
+          <a:xfrm>
+            <a:off x="457200" y="1028701"/>
+            <a:ext cx="6781800" cy="2000250"/>
+          </a:xfrm>
+        </p:spPr>
         <p:txBody>
           <a:bodyPr/>
           <a:lstStyle/>
           <a:p>
             <a:r>
-              <a:rPr lang="en-US" dirty="0"/>
-              <a:t>Finish pre-</a:t>
-            </a:r>
-            <a:r>
-              <a:rPr lang="en-US" dirty="0" err="1"/>
-              <a:t>fabs</a:t>
-            </a:r>
-            <a:r>
-              <a:rPr lang="en-US" dirty="0"/>
-              <a:t> for level 3</a:t>
-            </a:r>
-          </a:p>
-          <a:p>
-            <a:r>
-              <a:rPr lang="en-US" dirty="0"/>
-              <a:t>Complete level 3 by adding functionality to the prefabs</a:t>
-            </a:r>
-          </a:p>
-          <a:p>
-            <a:r>
-              <a:rPr lang="en-US" dirty="0"/>
-              <a:t>Convert scripts to interface with future objects with similar behavior</a:t>
-            </a:r>
-          </a:p>
-          <a:p>
-            <a:r>
-              <a:rPr lang="en-US" dirty="0"/>
-              <a:t>Add procedures for source control</a:t>
-            </a:r>
-          </a:p>
-          <a:p>
-            <a:r>
-              <a:rPr lang="en-US" dirty="0"/>
-              <a:t>Add procedures for installing applications on </a:t>
-            </a:r>
-            <a:r>
-              <a:rPr lang="en-US" dirty="0" err="1"/>
-              <a:t>Ipad</a:t>
-            </a:r>
-            <a:endParaRPr lang="en-US" dirty="0"/>
-          </a:p>
-          <a:p>
-            <a:r>
-              <a:rPr lang="en-US" dirty="0"/>
-              <a:t>Continue with detailed documentation for future groups</a:t>
-            </a:r>
-          </a:p>
-          <a:p>
-            <a:r>
-              <a:rPr lang="en-US" dirty="0"/>
-              <a:t>Maintain contact with customer</a:t>
-            </a:r>
-          </a:p>
-          <a:p>
-            <a:endParaRPr lang="en-US" dirty="0"/>
+              <a:rPr lang="en-US" sz="1600" b="1" dirty="0" err="1"/>
+              <a:t>BioRubeBot</a:t>
+            </a:r>
+            <a:r>
+              <a:rPr lang="en-US" sz="1600" b="1" dirty="0"/>
+              <a:t> has made great strides</a:t>
+            </a:r>
+          </a:p>
+          <a:p>
+            <a:pPr lvl="1"/>
+            <a:r>
+              <a:rPr lang="en-US" sz="1600" dirty="0"/>
+              <a:t>Functionality has been vastly improved</a:t>
+            </a:r>
+          </a:p>
+          <a:p>
+            <a:pPr lvl="1"/>
+            <a:r>
+              <a:rPr lang="en-US" sz="1600" dirty="0"/>
+              <a:t>Refactored code for better efficiency and usability</a:t>
+            </a:r>
+          </a:p>
+          <a:p>
+            <a:pPr lvl="1"/>
+            <a:r>
+              <a:rPr lang="en-US" sz="1600" dirty="0"/>
+              <a:t>Documentation has substantially been improved</a:t>
+            </a:r>
+          </a:p>
+          <a:p>
+            <a:pPr lvl="1"/>
+            <a:r>
+              <a:rPr lang="en-US" sz="1600" dirty="0"/>
+              <a:t>Staged the project for future groups</a:t>
+            </a:r>
           </a:p>
         </p:txBody>
       </p:sp>
     </p:spTree>
     <p:extLst>
       <p:ext uri="{BB962C8B-B14F-4D97-AF65-F5344CB8AC3E}">
-        <p14:creationId xmlns:p14="http://schemas.microsoft.com/office/powerpoint/2010/main" val="2842223120"/>
+        <p14:creationId xmlns:p14="http://schemas.microsoft.com/office/powerpoint/2010/main" val="2212414703"/>
       </p:ext>
     </p:extLst>
   </p:cSld>
@@ -18350,59 +18560,68 @@
           <a:lstStyle/>
           <a:p>
             <a:r>
-              <a:rPr lang="en-US" dirty="0"/>
-              <a:t>Advice for the group taking over this project:</a:t>
-            </a:r>
-          </a:p>
-          <a:p>
-            <a:pPr lvl="1"/>
-            <a:r>
-              <a:rPr lang="en-US" dirty="0"/>
-              <a:t>learn C#: the language used to drive Unity.</a:t>
-            </a:r>
-          </a:p>
-          <a:p>
-            <a:pPr lvl="1"/>
-            <a:r>
-              <a:rPr lang="en-US" dirty="0"/>
-              <a:t>Learn the Unity editor and how it works with the code that drives it</a:t>
-            </a:r>
-          </a:p>
-          <a:p>
-            <a:pPr lvl="1"/>
-            <a:r>
-              <a:rPr lang="en-US" dirty="0"/>
-              <a:t>Learn </a:t>
-            </a:r>
-            <a:r>
-              <a:rPr lang="en-US" dirty="0" err="1"/>
-              <a:t>Git</a:t>
-            </a:r>
-            <a:r>
-              <a:rPr lang="en-US" dirty="0"/>
-              <a:t> and source control</a:t>
-            </a:r>
-          </a:p>
-          <a:p>
-            <a:pPr lvl="1"/>
-            <a:r>
-              <a:rPr lang="en-US" dirty="0"/>
-              <a:t>Get Dr. Clines approval, she is very helpful and will be very clear with the direction of the project</a:t>
-            </a:r>
-          </a:p>
-          <a:p>
-            <a:pPr lvl="1"/>
-            <a:r>
-              <a:rPr lang="en-US" dirty="0"/>
-              <a:t> Learn the biology behind the project</a:t>
-            </a:r>
+              <a:rPr lang="en-US" sz="1600" dirty="0"/>
+              <a:t>Finish pre-</a:t>
+            </a:r>
+            <a:r>
+              <a:rPr lang="en-US" sz="1600" dirty="0" err="1"/>
+              <a:t>fabs</a:t>
+            </a:r>
+            <a:r>
+              <a:rPr lang="en-US" sz="1600" dirty="0"/>
+              <a:t> for level 3</a:t>
+            </a:r>
+          </a:p>
+          <a:p>
+            <a:r>
+              <a:rPr lang="en-US" sz="1600" dirty="0"/>
+              <a:t>Complete level 3 by adding functionality to the prefabs</a:t>
+            </a:r>
+          </a:p>
+          <a:p>
+            <a:r>
+              <a:rPr lang="en-US" sz="1600" dirty="0"/>
+              <a:t>Convert scripts to interface with future objects with similar behavior</a:t>
+            </a:r>
+          </a:p>
+          <a:p>
+            <a:r>
+              <a:rPr lang="en-US" sz="1600" dirty="0"/>
+              <a:t>Add procedures for source control</a:t>
+            </a:r>
+          </a:p>
+          <a:p>
+            <a:r>
+              <a:rPr lang="en-US" sz="1600" dirty="0"/>
+              <a:t>Add procedures for installing applications on </a:t>
+            </a:r>
+            <a:r>
+              <a:rPr lang="en-US" sz="1600" dirty="0" err="1"/>
+              <a:t>Ipad</a:t>
+            </a:r>
+            <a:endParaRPr lang="en-US" sz="1600" dirty="0"/>
+          </a:p>
+          <a:p>
+            <a:r>
+              <a:rPr lang="en-US" sz="1600" dirty="0"/>
+              <a:t>Continue with detailed documentation for future groups</a:t>
+            </a:r>
+          </a:p>
+          <a:p>
+            <a:r>
+              <a:rPr lang="en-US" sz="1600" dirty="0"/>
+              <a:t>Maintain contact with customer</a:t>
+            </a:r>
+          </a:p>
+          <a:p>
+            <a:endParaRPr lang="en-US" dirty="0"/>
           </a:p>
         </p:txBody>
       </p:sp>
     </p:spTree>
     <p:extLst>
       <p:ext uri="{BB962C8B-B14F-4D97-AF65-F5344CB8AC3E}">
-        <p14:creationId xmlns:p14="http://schemas.microsoft.com/office/powerpoint/2010/main" val="1080832448"/>
+        <p14:creationId xmlns:p14="http://schemas.microsoft.com/office/powerpoint/2010/main" val="2842223120"/>
       </p:ext>
     </p:extLst>
   </p:cSld>
@@ -18431,6 +18650,147 @@
       </p:grpSpPr>
       <p:sp>
         <p:nvSpPr>
+          <p:cNvPr id="2" name="Title 1"/>
+          <p:cNvSpPr>
+            <a:spLocks noGrp="1"/>
+          </p:cNvSpPr>
+          <p:nvPr>
+            <p:ph type="title"/>
+          </p:nvPr>
+        </p:nvSpPr>
+        <p:spPr/>
+        <p:txBody>
+          <a:bodyPr/>
+          <a:lstStyle/>
+          <a:p>
+            <a:r>
+              <a:rPr lang="en-US" dirty="0"/>
+              <a:t>Next steps</a:t>
+            </a:r>
+          </a:p>
+        </p:txBody>
+      </p:sp>
+      <p:sp>
+        <p:nvSpPr>
+          <p:cNvPr id="3" name="Content Placeholder 2"/>
+          <p:cNvSpPr>
+            <a:spLocks noGrp="1"/>
+          </p:cNvSpPr>
+          <p:nvPr>
+            <p:ph idx="1"/>
+          </p:nvPr>
+        </p:nvSpPr>
+        <p:spPr/>
+        <p:txBody>
+          <a:bodyPr/>
+          <a:lstStyle/>
+          <a:p>
+            <a:r>
+              <a:rPr lang="en-US" sz="1600" b="1" dirty="0"/>
+              <a:t>Advice for the group taking over this project</a:t>
+            </a:r>
+            <a:r>
+              <a:rPr lang="en-US" sz="1600" b="1" dirty="0" smtClean="0"/>
+              <a:t>:</a:t>
+            </a:r>
+          </a:p>
+          <a:p>
+            <a:pPr lvl="1"/>
+            <a:r>
+              <a:rPr lang="en-US" sz="1600" dirty="0"/>
+              <a:t>Learn the biology behind the </a:t>
+            </a:r>
+            <a:r>
+              <a:rPr lang="en-US" sz="1600" dirty="0" smtClean="0"/>
+              <a:t>project.</a:t>
+            </a:r>
+            <a:endParaRPr lang="en-US" sz="1600" b="1" dirty="0"/>
+          </a:p>
+          <a:p>
+            <a:pPr lvl="1"/>
+            <a:r>
+              <a:rPr lang="en-US" sz="1600" dirty="0"/>
+              <a:t>learn C#: the language used to drive Unity.</a:t>
+            </a:r>
+          </a:p>
+          <a:p>
+            <a:pPr lvl="1"/>
+            <a:r>
+              <a:rPr lang="en-US" sz="1600" dirty="0"/>
+              <a:t>Learn the Unity editor and how it works with the code that drives </a:t>
+            </a:r>
+            <a:r>
+              <a:rPr lang="en-US" sz="1600" dirty="0" smtClean="0"/>
+              <a:t>it.</a:t>
+            </a:r>
+            <a:endParaRPr lang="en-US" sz="1600" dirty="0"/>
+          </a:p>
+          <a:p>
+            <a:pPr lvl="1"/>
+            <a:r>
+              <a:rPr lang="en-US" sz="1600" dirty="0"/>
+              <a:t>Learn </a:t>
+            </a:r>
+            <a:r>
+              <a:rPr lang="en-US" sz="1600" dirty="0" err="1"/>
+              <a:t>Git</a:t>
+            </a:r>
+            <a:r>
+              <a:rPr lang="en-US" sz="1600" dirty="0"/>
+              <a:t> and source </a:t>
+            </a:r>
+            <a:r>
+              <a:rPr lang="en-US" sz="1600" dirty="0" smtClean="0"/>
+              <a:t>control.</a:t>
+            </a:r>
+            <a:endParaRPr lang="en-US" sz="1600" dirty="0"/>
+          </a:p>
+          <a:p>
+            <a:pPr lvl="1"/>
+            <a:r>
+              <a:rPr lang="en-US" sz="1600" dirty="0"/>
+              <a:t>Get Dr. Clines approval, she is very helpful and will be very clear with the direction of the </a:t>
+            </a:r>
+            <a:r>
+              <a:rPr lang="en-US" sz="1600" dirty="0" smtClean="0"/>
+              <a:t>project.</a:t>
+            </a:r>
+            <a:endParaRPr lang="en-US" sz="1600" dirty="0"/>
+          </a:p>
+        </p:txBody>
+      </p:sp>
+    </p:spTree>
+    <p:extLst>
+      <p:ext uri="{BB962C8B-B14F-4D97-AF65-F5344CB8AC3E}">
+        <p14:creationId xmlns:p14="http://schemas.microsoft.com/office/powerpoint/2010/main" val="1080832448"/>
+      </p:ext>
+    </p:extLst>
+  </p:cSld>
+  <p:clrMapOvr>
+    <a:masterClrMapping/>
+  </p:clrMapOvr>
+</p:sld>
+</file>
+
+<file path=ppt/slides/slide14.xml><?xml version="1.0" encoding="utf-8"?>
+<p:sld xmlns:a="http://schemas.openxmlformats.org/drawingml/2006/main" xmlns:r="http://schemas.openxmlformats.org/officeDocument/2006/relationships" xmlns:p="http://schemas.openxmlformats.org/presentationml/2006/main">
+  <p:cSld>
+    <p:spTree>
+      <p:nvGrpSpPr>
+        <p:cNvPr id="1" name=""/>
+        <p:cNvGrpSpPr/>
+        <p:nvPr/>
+      </p:nvGrpSpPr>
+      <p:grpSpPr>
+        <a:xfrm>
+          <a:off x="0" y="0"/>
+          <a:ext cx="0" cy="0"/>
+          <a:chOff x="0" y="0"/>
+          <a:chExt cx="0" cy="0"/>
+        </a:xfrm>
+      </p:grpSpPr>
+      <p:sp>
+        <p:nvSpPr>
           <p:cNvPr id="44034" name="Text Placeholder 2"/>
           <p:cNvSpPr>
             <a:spLocks noGrp="1"/>
@@ -18447,7 +18807,7 @@
         </p:spPr>
         <p:txBody>
           <a:bodyPr>
-            <a:normAutofit fontScale="70000" lnSpcReduction="20000"/>
+            <a:normAutofit fontScale="62500" lnSpcReduction="20000"/>
           </a:bodyPr>
           <a:lstStyle/>
           <a:p>
@@ -18955,7 +19315,7 @@
           <a:p>
             <a:r>
               <a:rPr lang="en-US" sz="2400" dirty="0"/>
-              <a:t>Finish level one.</a:t>
+              <a:t>Completing level one.</a:t>
             </a:r>
           </a:p>
           <a:p>
@@ -18967,7 +19327,7 @@
           <a:p>
             <a:r>
               <a:rPr lang="en-US" sz="2400" dirty="0"/>
-              <a:t>Design some prefabs for level three.</a:t>
+              <a:t>Starting design and implementation for level three.</a:t>
             </a:r>
           </a:p>
         </p:txBody>
@@ -19040,38 +19400,75 @@
           <a:lstStyle/>
           <a:p>
             <a:r>
+              <a:rPr lang="en-US" sz="2000" dirty="0" smtClean="0"/>
+              <a:t>Research most efficient ways to fix lag issues</a:t>
+            </a:r>
+            <a:endParaRPr lang="en-US" sz="2000" dirty="0"/>
+          </a:p>
+          <a:p>
+            <a:r>
+              <a:rPr lang="en-US" sz="2000" dirty="0" smtClean="0"/>
+              <a:t>Research Unity’s </a:t>
+            </a:r>
+            <a:r>
               <a:rPr lang="en-US" sz="2000" dirty="0"/>
-              <a:t>We performed CPU optimization techniques to discover what function was causing the game to lag.</a:t>
-            </a:r>
-          </a:p>
-          <a:p>
+              <a:t>documentation to better understand </a:t>
+            </a:r>
+            <a:r>
+              <a:rPr lang="en-US" sz="2000" dirty="0" smtClean="0"/>
+              <a:t>functionality</a:t>
+            </a:r>
             <a:r>
               <a:rPr lang="en-US" sz="2000" dirty="0"/>
-              <a:t>Researched Unity documentation to better understand its functionality.</a:t>
-            </a:r>
-          </a:p>
-          <a:p>
+              <a:t>.</a:t>
+            </a:r>
+          </a:p>
+          <a:p>
+            <a:r>
+              <a:rPr lang="en-US" sz="2000" dirty="0" smtClean="0"/>
+              <a:t>Study </a:t>
+            </a:r>
             <a:r>
               <a:rPr lang="en-US" sz="2000" dirty="0"/>
-              <a:t>Studied materials provided by customer to understand the biology.</a:t>
-            </a:r>
-          </a:p>
-          <a:p>
+              <a:t>materials provided by customer to understand the biology.</a:t>
+            </a:r>
+          </a:p>
+          <a:p>
+            <a:r>
+              <a:rPr lang="en-US" sz="2000" dirty="0" smtClean="0"/>
+              <a:t>Utilize </a:t>
+            </a:r>
             <a:r>
               <a:rPr lang="en-US" sz="2000" dirty="0"/>
-              <a:t>Utilized group chat services to communicate and delegate tasks.</a:t>
-            </a:r>
-          </a:p>
-          <a:p>
+              <a:t>group chat services to communicate and delegate tasks.</a:t>
+            </a:r>
+          </a:p>
+          <a:p>
+            <a:r>
+              <a:rPr lang="en-US" sz="2000" dirty="0" smtClean="0"/>
+              <a:t>Determine best fix actions for </a:t>
+            </a:r>
             <a:r>
               <a:rPr lang="en-US" sz="2000" dirty="0"/>
-              <a:t>Fixed G-Protein, fast forward button, and issues with IPAD</a:t>
-            </a:r>
-          </a:p>
-          <a:p>
+              <a:t>G-Protein, fast forward button, and </a:t>
+            </a:r>
+            <a:r>
+              <a:rPr lang="en-US" sz="2000" dirty="0" smtClean="0"/>
+              <a:t>various </a:t>
+            </a:r>
             <a:r>
               <a:rPr lang="en-US" sz="2000" dirty="0"/>
-              <a:t>Worked with customer to design new pieces and implemented this in level 2.</a:t>
+              <a:t>other issues with the IPAD</a:t>
+            </a:r>
+          </a:p>
+          <a:p>
+            <a:r>
+              <a:rPr lang="en-US" sz="2000" dirty="0" smtClean="0"/>
+              <a:t>Work </a:t>
+            </a:r>
+            <a:r>
+              <a:rPr lang="en-US" sz="2000" dirty="0"/>
+              <a:t>with customer to design and implement new pieces in level 2.</a:t>
             </a:r>
           </a:p>
           <a:p>
@@ -19142,6 +19539,272 @@
           </a:p>
         </p:txBody>
       </p:sp>
+      <p:sp>
+        <p:nvSpPr>
+          <p:cNvPr id="12" name="TextBox 11"/>
+          <p:cNvSpPr txBox="1"/>
+          <p:nvPr/>
+        </p:nvSpPr>
+        <p:spPr>
+          <a:xfrm>
+            <a:off x="964364" y="882223"/>
+            <a:ext cx="1016836" cy="381000"/>
+          </a:xfrm>
+          <a:prstGeom prst="rect">
+            <a:avLst/>
+          </a:prstGeom>
+          <a:noFill/>
+        </p:spPr>
+        <p:txBody>
+          <a:bodyPr wrap="square" rtlCol="0">
+            <a:spAutoFit/>
+          </a:bodyPr>
+          <a:lstStyle/>
+          <a:p>
+            <a:r>
+              <a:rPr lang="en-US" dirty="0"/>
+              <a:t>Level 1</a:t>
+            </a:r>
+          </a:p>
+        </p:txBody>
+      </p:sp>
+      <p:sp>
+        <p:nvSpPr>
+          <p:cNvPr id="14" name="Content Placeholder 13"/>
+          <p:cNvSpPr>
+            <a:spLocks noGrp="1"/>
+          </p:cNvSpPr>
+          <p:nvPr>
+            <p:ph idx="1"/>
+          </p:nvPr>
+        </p:nvSpPr>
+        <p:spPr>
+          <a:xfrm>
+            <a:off x="3200400" y="1187447"/>
+            <a:ext cx="5638799" cy="3282104"/>
+          </a:xfrm>
+        </p:spPr>
+        <p:txBody>
+          <a:bodyPr/>
+          <a:lstStyle/>
+          <a:p>
+            <a:r>
+              <a:rPr lang="en-US" sz="1600" b="1" dirty="0"/>
+              <a:t>Fixed </a:t>
+            </a:r>
+            <a:r>
+              <a:rPr lang="en-US" sz="1600" b="1" dirty="0" smtClean="0"/>
+              <a:t>Lag &amp; Performance Issues</a:t>
+            </a:r>
+          </a:p>
+          <a:p>
+            <a:pPr lvl="1"/>
+            <a:r>
+              <a:rPr lang="en-US" sz="1600" dirty="0" smtClean="0"/>
+              <a:t>Performed </a:t>
+            </a:r>
+            <a:r>
+              <a:rPr lang="en-US" sz="1600" dirty="0"/>
+              <a:t>CPU optimization techniques to discover what function was causing the game to lag</a:t>
+            </a:r>
+            <a:r>
+              <a:rPr lang="en-US" sz="1600" dirty="0" smtClean="0"/>
+              <a:t>.</a:t>
+            </a:r>
+          </a:p>
+          <a:p>
+            <a:pPr lvl="1"/>
+            <a:r>
+              <a:rPr lang="en-US" sz="1600" dirty="0" smtClean="0"/>
+              <a:t>Refactored script to maximize performance and stop lag issues.</a:t>
+            </a:r>
+            <a:endParaRPr lang="en-US" sz="1600" b="1" dirty="0"/>
+          </a:p>
+          <a:p>
+            <a:r>
+              <a:rPr lang="en-US" sz="1600" b="1" dirty="0"/>
+              <a:t>Fixed bug with </a:t>
+            </a:r>
+            <a:r>
+              <a:rPr lang="en-US" sz="1600" b="1" dirty="0" smtClean="0"/>
+              <a:t>G-Protein</a:t>
+            </a:r>
+            <a:endParaRPr lang="en-US" sz="1600" b="1" dirty="0"/>
+          </a:p>
+          <a:p>
+            <a:pPr lvl="1"/>
+            <a:r>
+              <a:rPr lang="en-US" dirty="0" smtClean="0"/>
+              <a:t>G-Protein left the cell and preven</a:t>
+            </a:r>
+            <a:r>
+              <a:rPr lang="en-US" dirty="0" smtClean="0"/>
+              <a:t>ted the game from being win-able</a:t>
+            </a:r>
+          </a:p>
+          <a:p>
+            <a:pPr lvl="1"/>
+            <a:r>
+              <a:rPr lang="en-US" dirty="0" smtClean="0"/>
+              <a:t>Fixed the scripts </a:t>
+            </a:r>
+            <a:r>
+              <a:rPr lang="en-US" dirty="0" smtClean="0"/>
+              <a:t>to make the g-protein stay in place when activated by the receptor.</a:t>
+            </a:r>
+          </a:p>
+          <a:p>
+            <a:pPr lvl="1"/>
+            <a:r>
+              <a:rPr lang="en-US" dirty="0" smtClean="0"/>
+              <a:t>Ensured g-protein worked on </a:t>
+            </a:r>
+            <a:r>
+              <a:rPr lang="en-US" dirty="0" err="1" smtClean="0"/>
+              <a:t>Ipad</a:t>
+            </a:r>
+            <a:r>
+              <a:rPr lang="en-US" dirty="0" smtClean="0"/>
+              <a:t>. </a:t>
+            </a:r>
+          </a:p>
+          <a:p>
+            <a:r>
+              <a:rPr lang="en-US" sz="1600" b="1" dirty="0"/>
+              <a:t>Fixed Fast Forward </a:t>
+            </a:r>
+            <a:r>
+              <a:rPr lang="en-US" sz="1600" b="1" dirty="0" smtClean="0"/>
+              <a:t>button</a:t>
+            </a:r>
+            <a:endParaRPr lang="en-US" sz="1600" b="1" dirty="0"/>
+          </a:p>
+          <a:p>
+            <a:pPr lvl="1"/>
+            <a:r>
+              <a:rPr lang="en-US" dirty="0" smtClean="0"/>
+              <a:t>Changed the script to make the button toggle.</a:t>
+            </a:r>
+          </a:p>
+        </p:txBody>
+      </p:sp>
+      <p:pic>
+        <p:nvPicPr>
+          <p:cNvPr id="3" name="Picture 2"/>
+          <p:cNvPicPr>
+            <a:picLocks noChangeAspect="1"/>
+          </p:cNvPicPr>
+          <p:nvPr/>
+        </p:nvPicPr>
+        <p:blipFill>
+          <a:blip r:embed="rId3">
+            <a:extLst>
+              <a:ext uri="{28A0092B-C50C-407E-A947-70E740481C1C}">
+                <a14:useLocalDpi xmlns:a14="http://schemas.microsoft.com/office/drawing/2010/main" val="0"/>
+              </a:ext>
+            </a:extLst>
+          </a:blip>
+          <a:stretch>
+            <a:fillRect/>
+          </a:stretch>
+        </p:blipFill>
+        <p:spPr>
+          <a:xfrm>
+            <a:off x="112712" y="3148751"/>
+            <a:ext cx="2984500" cy="1320800"/>
+          </a:xfrm>
+          <a:prstGeom prst="rect">
+            <a:avLst/>
+          </a:prstGeom>
+        </p:spPr>
+      </p:pic>
+      <p:pic>
+        <p:nvPicPr>
+          <p:cNvPr id="5" name="Picture 4"/>
+          <p:cNvPicPr>
+            <a:picLocks noChangeAspect="1"/>
+          </p:cNvPicPr>
+          <p:nvPr/>
+        </p:nvPicPr>
+        <p:blipFill>
+          <a:blip r:embed="rId4">
+            <a:extLst>
+              <a:ext uri="{28A0092B-C50C-407E-A947-70E740481C1C}">
+                <a14:useLocalDpi xmlns:a14="http://schemas.microsoft.com/office/drawing/2010/main" val="0"/>
+              </a:ext>
+            </a:extLst>
+          </a:blip>
+          <a:stretch>
+            <a:fillRect/>
+          </a:stretch>
+        </p:blipFill>
+        <p:spPr>
+          <a:xfrm>
+            <a:off x="88900" y="1234649"/>
+            <a:ext cx="3048000" cy="1723264"/>
+          </a:xfrm>
+          <a:prstGeom prst="rect">
+            <a:avLst/>
+          </a:prstGeom>
+        </p:spPr>
+      </p:pic>
+    </p:spTree>
+    <p:extLst>
+      <p:ext uri="{BB962C8B-B14F-4D97-AF65-F5344CB8AC3E}">
+        <p14:creationId xmlns:p14="http://schemas.microsoft.com/office/powerpoint/2010/main" val="2080359699"/>
+      </p:ext>
+    </p:extLst>
+  </p:cSld>
+  <p:clrMapOvr>
+    <a:masterClrMapping/>
+  </p:clrMapOvr>
+</p:sld>
+</file>
+
+<file path=ppt/slides/slide6.xml><?xml version="1.0" encoding="utf-8"?>
+<p:sld xmlns:a="http://schemas.openxmlformats.org/drawingml/2006/main" xmlns:r="http://schemas.openxmlformats.org/officeDocument/2006/relationships" xmlns:p="http://schemas.openxmlformats.org/presentationml/2006/main">
+  <p:cSld>
+    <p:spTree>
+      <p:nvGrpSpPr>
+        <p:cNvPr id="1" name=""/>
+        <p:cNvGrpSpPr/>
+        <p:nvPr/>
+      </p:nvGrpSpPr>
+      <p:grpSpPr>
+        <a:xfrm>
+          <a:off x="0" y="0"/>
+          <a:ext cx="0" cy="0"/>
+          <a:chOff x="0" y="0"/>
+          <a:chExt cx="0" cy="0"/>
+        </a:xfrm>
+      </p:grpSpPr>
+      <p:sp>
+        <p:nvSpPr>
+          <p:cNvPr id="2" name="Title 1"/>
+          <p:cNvSpPr>
+            <a:spLocks noGrp="1"/>
+          </p:cNvSpPr>
+          <p:nvPr>
+            <p:ph type="title"/>
+          </p:nvPr>
+        </p:nvSpPr>
+        <p:spPr>
+          <a:xfrm>
+            <a:off x="457200" y="438150"/>
+            <a:ext cx="1524000" cy="422275"/>
+          </a:xfrm>
+        </p:spPr>
+        <p:txBody>
+          <a:bodyPr/>
+          <a:lstStyle/>
+          <a:p>
+            <a:r>
+              <a:rPr lang="en-US" dirty="0"/>
+              <a:t>Details</a:t>
+            </a:r>
+          </a:p>
+        </p:txBody>
+      </p:sp>
       <p:pic>
         <p:nvPicPr>
           <p:cNvPr id="9" name="Picture 8"/>
@@ -19273,8 +19936,8 @@
         </p:nvSpPr>
         <p:spPr>
           <a:xfrm>
-            <a:off x="3200400" y="1187447"/>
-            <a:ext cx="5439975" cy="1330326"/>
+            <a:off x="3200400" y="1187446"/>
+            <a:ext cx="5638799" cy="3060704"/>
           </a:xfrm>
         </p:spPr>
         <p:txBody>
@@ -19282,16 +19945,48 @@
           <a:lstStyle/>
           <a:p>
             <a:r>
-              <a:rPr lang="en-US" sz="1600" b="1" dirty="0"/>
+              <a:rPr lang="en-US" sz="1600" b="1" dirty="0" smtClean="0"/>
               <a:t>Developed a two part receptor</a:t>
             </a:r>
+            <a:endParaRPr lang="en-US" sz="1600" b="1" dirty="0"/>
           </a:p>
           <a:p>
             <a:pPr lvl="1"/>
             <a:r>
               <a:rPr lang="en-US" dirty="0"/>
-              <a:t>Created a left and right side to the original receptor.</a:t>
-            </a:r>
+              <a:t>Created </a:t>
+            </a:r>
+            <a:r>
+              <a:rPr lang="en-US" dirty="0" smtClean="0"/>
+              <a:t>prefabs for left </a:t>
+            </a:r>
+            <a:r>
+              <a:rPr lang="en-US" dirty="0"/>
+              <a:t>and right side to the original receptor.</a:t>
+            </a:r>
+          </a:p>
+          <a:p>
+            <a:pPr lvl="1"/>
+            <a:r>
+              <a:rPr lang="en-US" dirty="0" smtClean="0"/>
+              <a:t>Added </a:t>
+            </a:r>
+            <a:r>
+              <a:rPr lang="en-US" dirty="0"/>
+              <a:t>components to the new prefabs and attached </a:t>
+            </a:r>
+            <a:r>
+              <a:rPr lang="en-US" dirty="0" smtClean="0"/>
+              <a:t>behavior scripts.</a:t>
+            </a:r>
+            <a:endParaRPr lang="en-US" dirty="0"/>
+          </a:p>
+          <a:p>
+            <a:r>
+              <a:rPr lang="en-US" sz="1600" b="1" dirty="0" smtClean="0"/>
+              <a:t>Changed Menu Option to suite new prefabs</a:t>
+            </a:r>
+            <a:endParaRPr lang="en-US" sz="1600" dirty="0"/>
           </a:p>
           <a:p>
             <a:pPr lvl="1"/>
@@ -19304,30 +19999,171 @@
             <a:pPr lvl="1"/>
             <a:r>
               <a:rPr lang="en-US" dirty="0"/>
-              <a:t>Added components to the new prefabs and attached script for behavior.</a:t>
+              <a:t>Removed unused items from menu</a:t>
+            </a:r>
+            <a:r>
+              <a:rPr lang="en-US" dirty="0" smtClean="0"/>
+              <a:t>.</a:t>
+            </a:r>
+          </a:p>
+          <a:p>
+            <a:r>
+              <a:rPr lang="en-US" sz="1600" b="1" dirty="0"/>
+              <a:t>Fixed issues on IPad</a:t>
             </a:r>
           </a:p>
           <a:p>
             <a:pPr lvl="1"/>
             <a:r>
               <a:rPr lang="en-US" dirty="0"/>
-              <a:t>Removed unused items from menu.</a:t>
-            </a:r>
-          </a:p>
-        </p:txBody>
-      </p:sp>
-      <p:sp>
-        <p:nvSpPr>
-          <p:cNvPr id="15" name="Content Placeholder 13"/>
-          <p:cNvSpPr txBox="1">
-            <a:spLocks/>
-          </p:cNvSpPr>
+              <a:t>Fixed tree hierarchy.</a:t>
+            </a:r>
+          </a:p>
+          <a:p>
+            <a:pPr lvl="1"/>
+            <a:r>
+              <a:rPr lang="en-US" dirty="0"/>
+              <a:t>Fixed scripts for IPad functionality</a:t>
+            </a:r>
+            <a:r>
+              <a:rPr lang="en-US" dirty="0" smtClean="0"/>
+              <a:t>.</a:t>
+            </a:r>
+            <a:endParaRPr lang="en-US" dirty="0"/>
+          </a:p>
+        </p:txBody>
+      </p:sp>
+    </p:spTree>
+    <p:extLst>
+      <p:ext uri="{BB962C8B-B14F-4D97-AF65-F5344CB8AC3E}">
+        <p14:creationId xmlns:p14="http://schemas.microsoft.com/office/powerpoint/2010/main" val="3971806971"/>
+      </p:ext>
+    </p:extLst>
+  </p:cSld>
+  <p:clrMapOvr>
+    <a:masterClrMapping/>
+  </p:clrMapOvr>
+</p:sld>
+</file>
+
+<file path=ppt/slides/slide7.xml><?xml version="1.0" encoding="utf-8"?>
+<p:sld xmlns:a="http://schemas.openxmlformats.org/drawingml/2006/main" xmlns:r="http://schemas.openxmlformats.org/officeDocument/2006/relationships" xmlns:p="http://schemas.openxmlformats.org/presentationml/2006/main">
+  <p:cSld>
+    <p:spTree>
+      <p:nvGrpSpPr>
+        <p:cNvPr id="1" name=""/>
+        <p:cNvGrpSpPr/>
+        <p:nvPr/>
+      </p:nvGrpSpPr>
+      <p:grpSpPr>
+        <a:xfrm>
+          <a:off x="0" y="0"/>
+          <a:ext cx="0" cy="0"/>
+          <a:chOff x="0" y="0"/>
+          <a:chExt cx="0" cy="0"/>
+        </a:xfrm>
+      </p:grpSpPr>
+      <p:sp>
+        <p:nvSpPr>
+          <p:cNvPr id="2" name="Title 1"/>
+          <p:cNvSpPr>
+            <a:spLocks noGrp="1"/>
+          </p:cNvSpPr>
+          <p:nvPr>
+            <p:ph type="title"/>
+          </p:nvPr>
+        </p:nvSpPr>
+        <p:spPr/>
+        <p:txBody>
+          <a:bodyPr/>
+          <a:lstStyle/>
+          <a:p>
+            <a:r>
+              <a:rPr lang="en-US" dirty="0"/>
+              <a:t>Details</a:t>
+            </a:r>
+          </a:p>
+        </p:txBody>
+      </p:sp>
+      <p:sp>
+        <p:nvSpPr>
+          <p:cNvPr id="4" name="Footer Placeholder 3"/>
+          <p:cNvSpPr>
+            <a:spLocks noGrp="1"/>
+          </p:cNvSpPr>
+          <p:nvPr>
+            <p:ph type="ftr" sz="quarter" idx="11"/>
+          </p:nvPr>
+        </p:nvSpPr>
+        <p:spPr/>
+        <p:txBody>
+          <a:bodyPr/>
+          <a:lstStyle/>
+          <a:p>
+            <a:pPr>
+              <a:defRPr/>
+            </a:pPr>
+            <a:r>
+              <a:rPr lang="en-JM"/>
+              <a:t>Athens State University</a:t>
+            </a:r>
+          </a:p>
+        </p:txBody>
+      </p:sp>
+      <p:pic>
+        <p:nvPicPr>
+          <p:cNvPr id="5" name="Picture 4"/>
+          <p:cNvPicPr>
+            <a:picLocks noChangeAspect="1"/>
+          </p:cNvPicPr>
           <p:nvPr/>
-        </p:nvSpPr>
+        </p:nvPicPr>
+        <p:blipFill>
+          <a:blip r:embed="rId3">
+            <a:extLst>
+              <a:ext uri="{28A0092B-C50C-407E-A947-70E740481C1C}">
+                <a14:useLocalDpi xmlns:a14="http://schemas.microsoft.com/office/drawing/2010/main" val="0"/>
+              </a:ext>
+            </a:extLst>
+          </a:blip>
+          <a:stretch>
+            <a:fillRect/>
+          </a:stretch>
+        </p:blipFill>
+        <p:spPr>
+          <a:xfrm>
+            <a:off x="3124538" y="983481"/>
+            <a:ext cx="2285323" cy="2021124"/>
+          </a:xfrm>
+          <a:prstGeom prst="rect">
+            <a:avLst/>
+          </a:prstGeom>
+        </p:spPr>
+      </p:pic>
+      <p:pic>
+        <p:nvPicPr>
+          <p:cNvPr id="6" name="Content Placeholder 7"/>
+          <p:cNvPicPr>
+            <a:picLocks noChangeAspect="1"/>
+          </p:cNvPicPr>
+          <p:nvPr/>
+        </p:nvPicPr>
+        <p:blipFill>
+          <a:blip r:embed="rId4">
+            <a:extLst>
+              <a:ext uri="{28A0092B-C50C-407E-A947-70E740481C1C}">
+                <a14:useLocalDpi xmlns:a14="http://schemas.microsoft.com/office/drawing/2010/main" val="0"/>
+              </a:ext>
+            </a:extLst>
+          </a:blip>
+          <a:stretch>
+            <a:fillRect/>
+          </a:stretch>
+        </p:blipFill>
         <p:spPr bwMode="auto">
           <a:xfrm>
-            <a:off x="3200399" y="2536824"/>
-            <a:ext cx="5439975" cy="1330326"/>
+            <a:off x="152400" y="983481"/>
+            <a:ext cx="2651760" cy="1837944"/>
           </a:xfrm>
           <a:prstGeom prst="rect">
             <a:avLst/>
@@ -19356,360 +20192,6 @@
             </a:ext>
           </a:extLst>
         </p:spPr>
-        <p:txBody>
-          <a:bodyPr vert="horz" wrap="square" lIns="91440" tIns="45720" rIns="91440" bIns="45720" numCol="1" anchor="t" anchorCtr="0" compatLnSpc="1">
-            <a:prstTxWarp prst="textNoShape">
-              <a:avLst/>
-            </a:prstTxWarp>
-          </a:bodyPr>
-          <a:lstStyle>
-            <a:lvl1pPr marL="342900" indent="-342900" algn="l" rtl="0" eaLnBrk="1" fontAlgn="base" hangingPunct="1">
-              <a:lnSpc>
-                <a:spcPct val="110000"/>
-              </a:lnSpc>
-              <a:spcBef>
-                <a:spcPct val="0"/>
-              </a:spcBef>
-              <a:spcAft>
-                <a:spcPct val="0"/>
-              </a:spcAft>
-              <a:buFont typeface="Arial" pitchFamily="34" charset="0"/>
-              <a:buChar char="•"/>
-              <a:defRPr sz="1400" kern="1200">
-                <a:solidFill>
-                  <a:srgbClr val="262626"/>
-                </a:solidFill>
-                <a:latin typeface="Futura LT Condensed"/>
-                <a:ea typeface="ＭＳ Ｐゴシック" charset="0"/>
-                <a:cs typeface="Futura LT Condensed"/>
-              </a:defRPr>
-            </a:lvl1pPr>
-            <a:lvl2pPr marL="742950" indent="-285750" algn="l" rtl="0" eaLnBrk="1" fontAlgn="base" hangingPunct="1">
-              <a:lnSpc>
-                <a:spcPct val="110000"/>
-              </a:lnSpc>
-              <a:spcBef>
-                <a:spcPct val="0"/>
-              </a:spcBef>
-              <a:spcAft>
-                <a:spcPct val="0"/>
-              </a:spcAft>
-              <a:buFont typeface="Arial" pitchFamily="34" charset="0"/>
-              <a:buChar char="–"/>
-              <a:defRPr sz="1400" kern="1200">
-                <a:solidFill>
-                  <a:srgbClr val="262626"/>
-                </a:solidFill>
-                <a:latin typeface="Futura LT Condensed"/>
-                <a:ea typeface="Futura LT Condensed"/>
-                <a:cs typeface="Futura LT Condensed"/>
-              </a:defRPr>
-            </a:lvl2pPr>
-            <a:lvl3pPr marL="1143000" indent="-228600" algn="l" rtl="0" eaLnBrk="1" fontAlgn="base" hangingPunct="1">
-              <a:lnSpc>
-                <a:spcPct val="110000"/>
-              </a:lnSpc>
-              <a:spcBef>
-                <a:spcPct val="0"/>
-              </a:spcBef>
-              <a:spcAft>
-                <a:spcPct val="0"/>
-              </a:spcAft>
-              <a:buFont typeface="Arial" pitchFamily="34" charset="0"/>
-              <a:buChar char="•"/>
-              <a:defRPr sz="1400" kern="1200">
-                <a:solidFill>
-                  <a:srgbClr val="262626"/>
-                </a:solidFill>
-                <a:latin typeface="Futura LT Condensed"/>
-                <a:ea typeface="Futura LT Condensed"/>
-                <a:cs typeface="Futura LT Condensed"/>
-              </a:defRPr>
-            </a:lvl3pPr>
-            <a:lvl4pPr marL="1600200" indent="-228600" algn="l" rtl="0" eaLnBrk="1" fontAlgn="base" hangingPunct="1">
-              <a:lnSpc>
-                <a:spcPct val="110000"/>
-              </a:lnSpc>
-              <a:spcBef>
-                <a:spcPct val="0"/>
-              </a:spcBef>
-              <a:spcAft>
-                <a:spcPct val="0"/>
-              </a:spcAft>
-              <a:buFont typeface="Arial" pitchFamily="34" charset="0"/>
-              <a:buChar char="–"/>
-              <a:defRPr sz="1400" kern="1200">
-                <a:solidFill>
-                  <a:srgbClr val="262626"/>
-                </a:solidFill>
-                <a:latin typeface="Futura LT Condensed"/>
-                <a:ea typeface="Futura LT Condensed"/>
-                <a:cs typeface="Futura LT Condensed"/>
-              </a:defRPr>
-            </a:lvl4pPr>
-            <a:lvl5pPr marL="2057400" indent="-228600" algn="l" rtl="0" eaLnBrk="1" fontAlgn="base" hangingPunct="1">
-              <a:lnSpc>
-                <a:spcPct val="110000"/>
-              </a:lnSpc>
-              <a:spcBef>
-                <a:spcPct val="0"/>
-              </a:spcBef>
-              <a:spcAft>
-                <a:spcPct val="0"/>
-              </a:spcAft>
-              <a:buFont typeface="Arial" pitchFamily="34" charset="0"/>
-              <a:buChar char="»"/>
-              <a:defRPr sz="1400" kern="1200">
-                <a:solidFill>
-                  <a:srgbClr val="262626"/>
-                </a:solidFill>
-                <a:latin typeface="Futura LT Condensed"/>
-                <a:ea typeface="Futura LT Condensed"/>
-                <a:cs typeface="Futura LT Condensed"/>
-              </a:defRPr>
-            </a:lvl5pPr>
-            <a:lvl6pPr marL="2514600" indent="-228600" algn="l" defTabSz="914400" rtl="0" eaLnBrk="1" latinLnBrk="0" hangingPunct="1">
-              <a:spcBef>
-                <a:spcPct val="20000"/>
-              </a:spcBef>
-              <a:buFont typeface="Arial" pitchFamily="34" charset="0"/>
-              <a:buChar char="•"/>
-              <a:defRPr sz="2000" kern="1200">
-                <a:solidFill>
-                  <a:schemeClr val="tx1"/>
-                </a:solidFill>
-                <a:latin typeface="+mn-lt"/>
-                <a:ea typeface="+mn-ea"/>
-                <a:cs typeface="+mn-cs"/>
-              </a:defRPr>
-            </a:lvl6pPr>
-            <a:lvl7pPr marL="2971800" indent="-228600" algn="l" defTabSz="914400" rtl="0" eaLnBrk="1" latinLnBrk="0" hangingPunct="1">
-              <a:spcBef>
-                <a:spcPct val="20000"/>
-              </a:spcBef>
-              <a:buFont typeface="Arial" pitchFamily="34" charset="0"/>
-              <a:buChar char="•"/>
-              <a:defRPr sz="2000" kern="1200">
-                <a:solidFill>
-                  <a:schemeClr val="tx1"/>
-                </a:solidFill>
-                <a:latin typeface="+mn-lt"/>
-                <a:ea typeface="+mn-ea"/>
-                <a:cs typeface="+mn-cs"/>
-              </a:defRPr>
-            </a:lvl7pPr>
-            <a:lvl8pPr marL="3429000" indent="-228600" algn="l" defTabSz="914400" rtl="0" eaLnBrk="1" latinLnBrk="0" hangingPunct="1">
-              <a:spcBef>
-                <a:spcPct val="20000"/>
-              </a:spcBef>
-              <a:buFont typeface="Arial" pitchFamily="34" charset="0"/>
-              <a:buChar char="•"/>
-              <a:defRPr sz="2000" kern="1200">
-                <a:solidFill>
-                  <a:schemeClr val="tx1"/>
-                </a:solidFill>
-                <a:latin typeface="+mn-lt"/>
-                <a:ea typeface="+mn-ea"/>
-                <a:cs typeface="+mn-cs"/>
-              </a:defRPr>
-            </a:lvl8pPr>
-            <a:lvl9pPr marL="3886200" indent="-228600" algn="l" defTabSz="914400" rtl="0" eaLnBrk="1" latinLnBrk="0" hangingPunct="1">
-              <a:spcBef>
-                <a:spcPct val="20000"/>
-              </a:spcBef>
-              <a:buFont typeface="Arial" pitchFamily="34" charset="0"/>
-              <a:buChar char="•"/>
-              <a:defRPr sz="2000" kern="1200">
-                <a:solidFill>
-                  <a:schemeClr val="tx1"/>
-                </a:solidFill>
-                <a:latin typeface="+mn-lt"/>
-                <a:ea typeface="+mn-ea"/>
-                <a:cs typeface="+mn-cs"/>
-              </a:defRPr>
-            </a:lvl9pPr>
-          </a:lstStyle>
-          <a:p>
-            <a:r>
-              <a:rPr lang="en-US" sz="1600" b="1" dirty="0"/>
-              <a:t>Fixed issues on IPad</a:t>
-            </a:r>
-          </a:p>
-          <a:p>
-            <a:pPr lvl="1"/>
-            <a:r>
-              <a:rPr lang="en-US" dirty="0"/>
-              <a:t>Fixed tree hierarchy.</a:t>
-            </a:r>
-          </a:p>
-          <a:p>
-            <a:pPr lvl="1"/>
-            <a:r>
-              <a:rPr lang="en-US" dirty="0"/>
-              <a:t>Fixed scripts for IPad functionality.</a:t>
-            </a:r>
-          </a:p>
-        </p:txBody>
-      </p:sp>
-    </p:spTree>
-    <p:extLst>
-      <p:ext uri="{BB962C8B-B14F-4D97-AF65-F5344CB8AC3E}">
-        <p14:creationId xmlns:p14="http://schemas.microsoft.com/office/powerpoint/2010/main" val="3971806971"/>
-      </p:ext>
-    </p:extLst>
-  </p:cSld>
-  <p:clrMapOvr>
-    <a:masterClrMapping/>
-  </p:clrMapOvr>
-</p:sld>
-</file>
-
-<file path=ppt/slides/slide6.xml><?xml version="1.0" encoding="utf-8"?>
-<p:sld xmlns:a="http://schemas.openxmlformats.org/drawingml/2006/main" xmlns:r="http://schemas.openxmlformats.org/officeDocument/2006/relationships" xmlns:p="http://schemas.openxmlformats.org/presentationml/2006/main">
-  <p:cSld>
-    <p:spTree>
-      <p:nvGrpSpPr>
-        <p:cNvPr id="1" name=""/>
-        <p:cNvGrpSpPr/>
-        <p:nvPr/>
-      </p:nvGrpSpPr>
-      <p:grpSpPr>
-        <a:xfrm>
-          <a:off x="0" y="0"/>
-          <a:ext cx="0" cy="0"/>
-          <a:chOff x="0" y="0"/>
-          <a:chExt cx="0" cy="0"/>
-        </a:xfrm>
-      </p:grpSpPr>
-      <p:sp>
-        <p:nvSpPr>
-          <p:cNvPr id="2" name="Title 1"/>
-          <p:cNvSpPr>
-            <a:spLocks noGrp="1"/>
-          </p:cNvSpPr>
-          <p:nvPr>
-            <p:ph type="title"/>
-          </p:nvPr>
-        </p:nvSpPr>
-        <p:spPr/>
-        <p:txBody>
-          <a:bodyPr/>
-          <a:lstStyle/>
-          <a:p>
-            <a:r>
-              <a:rPr lang="en-US" dirty="0"/>
-              <a:t>Details</a:t>
-            </a:r>
-          </a:p>
-        </p:txBody>
-      </p:sp>
-      <p:sp>
-        <p:nvSpPr>
-          <p:cNvPr id="4" name="Footer Placeholder 3"/>
-          <p:cNvSpPr>
-            <a:spLocks noGrp="1"/>
-          </p:cNvSpPr>
-          <p:nvPr>
-            <p:ph type="ftr" sz="quarter" idx="11"/>
-          </p:nvPr>
-        </p:nvSpPr>
-        <p:spPr/>
-        <p:txBody>
-          <a:bodyPr/>
-          <a:lstStyle/>
-          <a:p>
-            <a:pPr>
-              <a:defRPr/>
-            </a:pPr>
-            <a:r>
-              <a:rPr lang="en-JM"/>
-              <a:t>Athens State University</a:t>
-            </a:r>
-          </a:p>
-        </p:txBody>
-      </p:sp>
-      <p:pic>
-        <p:nvPicPr>
-          <p:cNvPr id="5" name="Picture 4"/>
-          <p:cNvPicPr>
-            <a:picLocks noChangeAspect="1"/>
-          </p:cNvPicPr>
-          <p:nvPr/>
-        </p:nvPicPr>
-        <p:blipFill>
-          <a:blip r:embed="rId3">
-            <a:extLst>
-              <a:ext uri="{28A0092B-C50C-407E-A947-70E740481C1C}">
-                <a14:useLocalDpi xmlns:a14="http://schemas.microsoft.com/office/drawing/2010/main" val="0"/>
-              </a:ext>
-            </a:extLst>
-          </a:blip>
-          <a:stretch>
-            <a:fillRect/>
-          </a:stretch>
-        </p:blipFill>
-        <p:spPr>
-          <a:xfrm>
-            <a:off x="3124538" y="983481"/>
-            <a:ext cx="2285323" cy="2021124"/>
-          </a:xfrm>
-          <a:prstGeom prst="rect">
-            <a:avLst/>
-          </a:prstGeom>
-        </p:spPr>
-      </p:pic>
-      <p:pic>
-        <p:nvPicPr>
-          <p:cNvPr id="6" name="Content Placeholder 7"/>
-          <p:cNvPicPr>
-            <a:picLocks noChangeAspect="1"/>
-          </p:cNvPicPr>
-          <p:nvPr/>
-        </p:nvPicPr>
-        <p:blipFill>
-          <a:blip r:embed="rId4">
-            <a:extLst>
-              <a:ext uri="{28A0092B-C50C-407E-A947-70E740481C1C}">
-                <a14:useLocalDpi xmlns:a14="http://schemas.microsoft.com/office/drawing/2010/main" val="0"/>
-              </a:ext>
-            </a:extLst>
-          </a:blip>
-          <a:stretch>
-            <a:fillRect/>
-          </a:stretch>
-        </p:blipFill>
-        <p:spPr bwMode="auto">
-          <a:xfrm>
-            <a:off x="152400" y="983481"/>
-            <a:ext cx="2651760" cy="1837944"/>
-          </a:xfrm>
-          <a:prstGeom prst="rect">
-            <a:avLst/>
-          </a:prstGeom>
-          <a:noFill/>
-          <a:ln>
-            <a:noFill/>
-          </a:ln>
-          <a:extLst>
-            <a:ext uri="{909E8E84-426E-40dd-AFC4-6F175D3DCCD1}">
-              <a14:hiddenFill xmlns="" xmlns:a14="http://schemas.microsoft.com/office/drawing/2010/main">
-                <a:solidFill>
-                  <a:srgbClr val="FFFFFF"/>
-                </a:solidFill>
-              </a14:hiddenFill>
-            </a:ext>
-            <a:ext uri="{91240B29-F687-4f45-9708-019B960494DF}">
-              <a14:hiddenLine xmlns="" xmlns:a14="http://schemas.microsoft.com/office/drawing/2010/main" w="9525">
-                <a:solidFill>
-                  <a:srgbClr val="000000"/>
-                </a:solidFill>
-                <a:miter lim="800000"/>
-                <a:headEnd/>
-                <a:tailEnd/>
-              </a14:hiddenLine>
-            </a:ext>
-          </a:extLst>
-        </p:spPr>
       </p:pic>
       <p:pic>
         <p:nvPicPr>
@@ -19923,163 +20405,6 @@
 </p:sld>
 </file>
 
-<file path=ppt/slides/slide7.xml><?xml version="1.0" encoding="utf-8"?>
-<p:sld xmlns:a="http://schemas.openxmlformats.org/drawingml/2006/main" xmlns:r="http://schemas.openxmlformats.org/officeDocument/2006/relationships" xmlns:p="http://schemas.openxmlformats.org/presentationml/2006/main">
-  <p:cSld>
-    <p:spTree>
-      <p:nvGrpSpPr>
-        <p:cNvPr id="1" name=""/>
-        <p:cNvGrpSpPr/>
-        <p:nvPr/>
-      </p:nvGrpSpPr>
-      <p:grpSpPr>
-        <a:xfrm>
-          <a:off x="0" y="0"/>
-          <a:ext cx="0" cy="0"/>
-          <a:chOff x="0" y="0"/>
-          <a:chExt cx="0" cy="0"/>
-        </a:xfrm>
-      </p:grpSpPr>
-      <p:sp>
-        <p:nvSpPr>
-          <p:cNvPr id="2" name="Title 1"/>
-          <p:cNvSpPr>
-            <a:spLocks noGrp="1"/>
-          </p:cNvSpPr>
-          <p:nvPr>
-            <p:ph type="title"/>
-          </p:nvPr>
-        </p:nvSpPr>
-        <p:spPr/>
-        <p:txBody>
-          <a:bodyPr/>
-          <a:lstStyle/>
-          <a:p>
-            <a:r>
-              <a:rPr lang="en-US" dirty="0"/>
-              <a:t>Results</a:t>
-            </a:r>
-          </a:p>
-        </p:txBody>
-      </p:sp>
-      <p:sp>
-        <p:nvSpPr>
-          <p:cNvPr id="3" name="Content Placeholder 2"/>
-          <p:cNvSpPr>
-            <a:spLocks noGrp="1"/>
-          </p:cNvSpPr>
-          <p:nvPr>
-            <p:ph idx="1"/>
-          </p:nvPr>
-        </p:nvSpPr>
-        <p:spPr/>
-        <p:txBody>
-          <a:bodyPr/>
-          <a:lstStyle/>
-          <a:p>
-            <a:r>
-              <a:rPr lang="en-US" dirty="0"/>
-              <a:t>A fully functional level 1</a:t>
-            </a:r>
-          </a:p>
-          <a:p>
-            <a:pPr lvl="1"/>
-            <a:r>
-              <a:rPr lang="en-US" dirty="0"/>
-              <a:t>Lag issues fixed</a:t>
-            </a:r>
-          </a:p>
-          <a:p>
-            <a:pPr lvl="1"/>
-            <a:r>
-              <a:rPr lang="en-US" dirty="0"/>
-              <a:t>G-Protein no longer leaves cell wall</a:t>
-            </a:r>
-          </a:p>
-          <a:p>
-            <a:pPr lvl="1"/>
-            <a:r>
-              <a:rPr lang="en-US" dirty="0"/>
-              <a:t>Fast forward button toggles on/off</a:t>
-            </a:r>
-          </a:p>
-          <a:p>
-            <a:r>
-              <a:rPr lang="en-US" dirty="0"/>
-              <a:t>A fully functional level 2</a:t>
-            </a:r>
-          </a:p>
-          <a:p>
-            <a:pPr lvl="1"/>
-            <a:r>
-              <a:rPr lang="en-US" dirty="0"/>
-              <a:t>Left and right receptors created</a:t>
-            </a:r>
-          </a:p>
-          <a:p>
-            <a:pPr lvl="1"/>
-            <a:r>
-              <a:rPr lang="en-US" dirty="0"/>
-              <a:t>Added mobility and snapping functionality</a:t>
-            </a:r>
-          </a:p>
-          <a:p>
-            <a:pPr lvl="1"/>
-            <a:r>
-              <a:rPr lang="en-US" dirty="0" err="1"/>
-              <a:t>Ipad</a:t>
-            </a:r>
-            <a:r>
-              <a:rPr lang="en-US" dirty="0"/>
-              <a:t> issues tested and fixed</a:t>
-            </a:r>
-          </a:p>
-          <a:p>
-            <a:r>
-              <a:rPr lang="en-US" dirty="0"/>
-              <a:t>Began implementation of level 3</a:t>
-            </a:r>
-          </a:p>
-          <a:p>
-            <a:pPr lvl="1"/>
-            <a:r>
-              <a:rPr lang="en-US" dirty="0"/>
-              <a:t>Creation of trimeric g-protein</a:t>
-            </a:r>
-          </a:p>
-          <a:p>
-            <a:pPr lvl="1"/>
-            <a:r>
-              <a:rPr lang="en-US" dirty="0"/>
-              <a:t>Documentation for level 3 completion created</a:t>
-            </a:r>
-          </a:p>
-          <a:p>
-            <a:pPr lvl="1"/>
-            <a:endParaRPr lang="en-US" dirty="0"/>
-          </a:p>
-          <a:p>
-            <a:pPr lvl="1"/>
-            <a:endParaRPr lang="en-US" dirty="0"/>
-          </a:p>
-          <a:p>
-            <a:endParaRPr lang="en-US" dirty="0"/>
-          </a:p>
-        </p:txBody>
-      </p:sp>
-    </p:spTree>
-    <p:extLst>
-      <p:ext uri="{BB962C8B-B14F-4D97-AF65-F5344CB8AC3E}">
-        <p14:creationId xmlns:p14="http://schemas.microsoft.com/office/powerpoint/2010/main" val="2771877381"/>
-      </p:ext>
-    </p:extLst>
-  </p:cSld>
-  <p:clrMapOvr>
-    <a:masterClrMapping/>
-  </p:clrMapOvr>
-</p:sld>
-</file>
-
 <file path=ppt/slides/slide8.xml><?xml version="1.0" encoding="utf-8"?>
 <p:sld xmlns:a="http://schemas.openxmlformats.org/drawingml/2006/main" xmlns:r="http://schemas.openxmlformats.org/officeDocument/2006/relationships" xmlns:p="http://schemas.openxmlformats.org/presentationml/2006/main">
   <p:cSld>
@@ -20114,98 +20439,120 @@
           <a:p>
             <a:r>
               <a:rPr lang="en-US" dirty="0"/>
-              <a:t>Demonstration</a:t>
-            </a:r>
-          </a:p>
-        </p:txBody>
-      </p:sp>
-      <p:pic>
-        <p:nvPicPr>
-          <p:cNvPr id="6" name="Content Placeholder 5"/>
-          <p:cNvPicPr>
-            <a:picLocks noGrp="1" noChangeAspect="1"/>
-          </p:cNvPicPr>
+              <a:t>Results</a:t>
+            </a:r>
+          </a:p>
+        </p:txBody>
+      </p:sp>
+      <p:sp>
+        <p:nvSpPr>
+          <p:cNvPr id="3" name="Content Placeholder 2"/>
+          <p:cNvSpPr>
+            <a:spLocks noGrp="1"/>
+          </p:cNvSpPr>
           <p:nvPr>
             <p:ph idx="1"/>
           </p:nvPr>
-        </p:nvPicPr>
-        <p:blipFill rotWithShape="1">
-          <a:blip r:embed="rId3">
-            <a:extLst>
-              <a:ext uri="{28A0092B-C50C-407E-A947-70E740481C1C}">
-                <a14:useLocalDpi xmlns:a14="http://schemas.microsoft.com/office/drawing/2010/main" val="0"/>
-              </a:ext>
-            </a:extLst>
-          </a:blip>
-          <a:srcRect t="54444" r="34565" b="16369"/>
-          <a:stretch/>
-        </p:blipFill>
-        <p:spPr>
-          <a:xfrm>
-            <a:off x="457200" y="860425"/>
-            <a:ext cx="8200284" cy="2244726"/>
-          </a:xfrm>
-        </p:spPr>
-      </p:pic>
-      <p:sp>
-        <p:nvSpPr>
-          <p:cNvPr id="4" name="TextBox 3"/>
-          <p:cNvSpPr txBox="1"/>
-          <p:nvPr/>
-        </p:nvSpPr>
-        <p:spPr>
-          <a:xfrm>
-            <a:off x="4495800" y="285750"/>
-            <a:ext cx="2057400" cy="369332"/>
-          </a:xfrm>
-          <a:prstGeom prst="rect">
-            <a:avLst/>
-          </a:prstGeom>
-          <a:noFill/>
-        </p:spPr>
-        <p:txBody>
-          <a:bodyPr wrap="square" rtlCol="0" anchor="t">
-            <a:spAutoFit/>
-          </a:bodyPr>
+        </p:nvSpPr>
+        <p:spPr/>
+        <p:txBody>
+          <a:bodyPr/>
           <a:lstStyle/>
           <a:p>
+            <a:r>
+              <a:rPr lang="en-US" sz="1600" b="1" dirty="0"/>
+              <a:t>A fully functional level 1</a:t>
+            </a:r>
+          </a:p>
+          <a:p>
+            <a:pPr lvl="1"/>
+            <a:r>
+              <a:rPr lang="en-US" dirty="0"/>
+              <a:t>Lag issues fixed</a:t>
+            </a:r>
+          </a:p>
+          <a:p>
+            <a:pPr lvl="1"/>
+            <a:r>
+              <a:rPr lang="en-US" dirty="0"/>
+              <a:t>G-Protein no longer leaves cell wall</a:t>
+            </a:r>
+          </a:p>
+          <a:p>
+            <a:pPr lvl="1"/>
+            <a:r>
+              <a:rPr lang="en-US" dirty="0"/>
+              <a:t>Fast forward button toggles on/off</a:t>
+            </a:r>
+          </a:p>
+          <a:p>
+            <a:r>
+              <a:rPr lang="en-US" b="1" dirty="0"/>
+              <a:t>A fully functional level 2</a:t>
+            </a:r>
+          </a:p>
+          <a:p>
+            <a:pPr lvl="1"/>
+            <a:r>
+              <a:rPr lang="en-US" dirty="0"/>
+              <a:t>Left and right receptors created</a:t>
+            </a:r>
+          </a:p>
+          <a:p>
+            <a:pPr lvl="1"/>
+            <a:r>
+              <a:rPr lang="en-US" dirty="0"/>
+              <a:t>Added mobility and snapping functionality</a:t>
+            </a:r>
+          </a:p>
+          <a:p>
+            <a:pPr lvl="1"/>
+            <a:r>
+              <a:rPr lang="en-US" dirty="0" err="1"/>
+              <a:t>Ipad</a:t>
+            </a:r>
+            <a:r>
+              <a:rPr lang="en-US" dirty="0"/>
+              <a:t> issues tested and fixed</a:t>
+            </a:r>
+          </a:p>
+          <a:p>
+            <a:r>
+              <a:rPr lang="en-US" sz="1600" b="1" dirty="0"/>
+              <a:t>Began implementation of level 3</a:t>
+            </a:r>
+          </a:p>
+          <a:p>
+            <a:pPr lvl="1"/>
+            <a:r>
+              <a:rPr lang="en-US" dirty="0"/>
+              <a:t>Creation of trimeric g-protein</a:t>
+            </a:r>
+          </a:p>
+          <a:p>
+            <a:pPr lvl="1"/>
+            <a:r>
+              <a:rPr lang="en-US" dirty="0"/>
+              <a:t>Documentation for level 3 completion created</a:t>
+            </a:r>
+          </a:p>
+          <a:p>
+            <a:pPr lvl="1"/>
             <a:endParaRPr lang="en-US" dirty="0"/>
           </a:p>
-        </p:txBody>
-      </p:sp>
-      <p:pic>
-        <p:nvPicPr>
-          <p:cNvPr id="7" name="Picture 6"/>
-          <p:cNvPicPr>
-            <a:picLocks noChangeAspect="1"/>
-          </p:cNvPicPr>
-          <p:nvPr/>
-        </p:nvPicPr>
-        <p:blipFill rotWithShape="1">
-          <a:blip r:embed="rId4">
-            <a:extLst>
-              <a:ext uri="{28A0092B-C50C-407E-A947-70E740481C1C}">
-                <a14:useLocalDpi xmlns:a14="http://schemas.microsoft.com/office/drawing/2010/main" val="0"/>
-              </a:ext>
-            </a:extLst>
-          </a:blip>
-          <a:srcRect t="55926" r="35185" b="15926"/>
-          <a:stretch/>
-        </p:blipFill>
-        <p:spPr>
-          <a:xfrm>
-            <a:off x="457200" y="2803526"/>
-            <a:ext cx="8200284" cy="1749424"/>
-          </a:xfrm>
-          <a:prstGeom prst="rect">
-            <a:avLst/>
-          </a:prstGeom>
-        </p:spPr>
-      </p:pic>
+          <a:p>
+            <a:pPr lvl="1"/>
+            <a:endParaRPr lang="en-US" dirty="0"/>
+          </a:p>
+          <a:p>
+            <a:endParaRPr lang="en-US" dirty="0"/>
+          </a:p>
+        </p:txBody>
+      </p:sp>
     </p:spTree>
     <p:extLst>
       <p:ext uri="{BB962C8B-B14F-4D97-AF65-F5344CB8AC3E}">
-        <p14:creationId xmlns:p14="http://schemas.microsoft.com/office/powerpoint/2010/main" val="1612021433"/>
+        <p14:creationId xmlns:p14="http://schemas.microsoft.com/office/powerpoint/2010/main" val="2771877381"/>
       </p:ext>
     </p:extLst>
   </p:cSld>
@@ -20254,125 +20601,93 @@
           </a:p>
         </p:txBody>
       </p:sp>
-      <p:sp>
-        <p:nvSpPr>
-          <p:cNvPr id="3" name="Content Placeholder 2"/>
-          <p:cNvSpPr>
-            <a:spLocks noGrp="1"/>
-          </p:cNvSpPr>
+      <p:pic>
+        <p:nvPicPr>
+          <p:cNvPr id="6" name="Content Placeholder 5"/>
+          <p:cNvPicPr>
+            <a:picLocks noGrp="1" noChangeAspect="1"/>
+          </p:cNvPicPr>
           <p:nvPr>
             <p:ph idx="1"/>
           </p:nvPr>
-        </p:nvSpPr>
-        <p:spPr/>
-        <p:txBody>
-          <a:bodyPr/>
+        </p:nvPicPr>
+        <p:blipFill rotWithShape="1">
+          <a:blip r:embed="rId3">
+            <a:extLst>
+              <a:ext uri="{28A0092B-C50C-407E-A947-70E740481C1C}">
+                <a14:useLocalDpi xmlns:a14="http://schemas.microsoft.com/office/drawing/2010/main" val="0"/>
+              </a:ext>
+            </a:extLst>
+          </a:blip>
+          <a:srcRect t="54444" r="34565" b="16369"/>
+          <a:stretch/>
+        </p:blipFill>
+        <p:spPr>
+          <a:xfrm>
+            <a:off x="457200" y="860425"/>
+            <a:ext cx="8200284" cy="2244726"/>
+          </a:xfrm>
+        </p:spPr>
+      </p:pic>
+      <p:sp>
+        <p:nvSpPr>
+          <p:cNvPr id="4" name="TextBox 3"/>
+          <p:cNvSpPr txBox="1"/>
+          <p:nvPr/>
+        </p:nvSpPr>
+        <p:spPr>
+          <a:xfrm>
+            <a:off x="4495800" y="285750"/>
+            <a:ext cx="2057400" cy="369332"/>
+          </a:xfrm>
+          <a:prstGeom prst="rect">
+            <a:avLst/>
+          </a:prstGeom>
+          <a:noFill/>
+        </p:spPr>
+        <p:txBody>
+          <a:bodyPr wrap="square" rtlCol="0" anchor="t">
+            <a:spAutoFit/>
+          </a:bodyPr>
           <a:lstStyle/>
           <a:p>
-            <a:r>
-              <a:rPr lang="en-US" b="1" dirty="0"/>
-              <a:t>Previous Version:</a:t>
-            </a:r>
-          </a:p>
-          <a:p>
-            <a:pPr lvl="1"/>
-            <a:r>
-              <a:rPr lang="en-US" dirty="0"/>
-              <a:t>Contained functional level one</a:t>
-            </a:r>
-          </a:p>
-          <a:p>
-            <a:pPr lvl="1"/>
-            <a:r>
-              <a:rPr lang="en-US" dirty="0"/>
-              <a:t>G-protein did not work correctly</a:t>
-            </a:r>
-          </a:p>
-          <a:p>
-            <a:pPr lvl="1"/>
-            <a:r>
-              <a:rPr lang="en-US" dirty="0"/>
-              <a:t>Fast forward but did not work correctly</a:t>
-            </a:r>
-          </a:p>
-          <a:p>
-            <a:pPr lvl="1"/>
-            <a:r>
-              <a:rPr lang="en-US" dirty="0"/>
-              <a:t>Very </a:t>
-            </a:r>
-            <a:r>
-              <a:rPr lang="en-US" dirty="0" err="1"/>
-              <a:t>laggy</a:t>
-            </a:r>
             <a:endParaRPr lang="en-US" dirty="0"/>
           </a:p>
-          <a:p>
-            <a:r>
-              <a:rPr lang="en-US" b="1" dirty="0"/>
-              <a:t>Latest Version:</a:t>
-            </a:r>
-          </a:p>
-          <a:p>
-            <a:pPr lvl="1"/>
-            <a:r>
-              <a:rPr lang="en-US" dirty="0"/>
-              <a:t>Contains functional level one &amp; two</a:t>
-            </a:r>
-          </a:p>
-          <a:p>
-            <a:pPr lvl="1"/>
-            <a:r>
-              <a:rPr lang="en-US" dirty="0"/>
-              <a:t>Runs smoothly</a:t>
-            </a:r>
-          </a:p>
-          <a:p>
-            <a:pPr lvl="1"/>
-            <a:r>
-              <a:rPr lang="en-US" dirty="0"/>
-              <a:t>All parts function as intended for both levels</a:t>
-            </a:r>
-          </a:p>
-          <a:p>
-            <a:pPr lvl="1"/>
-            <a:r>
-              <a:rPr lang="en-US" dirty="0"/>
-              <a:t>Contains new pre-</a:t>
-            </a:r>
-            <a:r>
-              <a:rPr lang="en-US" dirty="0" err="1"/>
-              <a:t>fabs</a:t>
-            </a:r>
-            <a:r>
-              <a:rPr lang="en-US" dirty="0"/>
-              <a:t> for level three</a:t>
-            </a:r>
-          </a:p>
-          <a:p>
-            <a:pPr lvl="1"/>
-            <a:r>
-              <a:rPr lang="en-US" dirty="0"/>
-              <a:t>Created fixed for </a:t>
-            </a:r>
-            <a:r>
-              <a:rPr lang="en-US" dirty="0" err="1"/>
-              <a:t>Ipad</a:t>
-            </a:r>
-            <a:endParaRPr lang="en-US" dirty="0"/>
-          </a:p>
-          <a:p>
-            <a:pPr marL="457200" lvl="1" indent="0">
-              <a:buNone/>
-            </a:pPr>
-            <a:endParaRPr lang="en-US" dirty="0"/>
-          </a:p>
-        </p:txBody>
-      </p:sp>
+        </p:txBody>
+      </p:sp>
+      <p:pic>
+        <p:nvPicPr>
+          <p:cNvPr id="7" name="Picture 6"/>
+          <p:cNvPicPr>
+            <a:picLocks noChangeAspect="1"/>
+          </p:cNvPicPr>
+          <p:nvPr/>
+        </p:nvPicPr>
+        <p:blipFill rotWithShape="1">
+          <a:blip r:embed="rId4">
+            <a:extLst>
+              <a:ext uri="{28A0092B-C50C-407E-A947-70E740481C1C}">
+                <a14:useLocalDpi xmlns:a14="http://schemas.microsoft.com/office/drawing/2010/main" val="0"/>
+              </a:ext>
+            </a:extLst>
+          </a:blip>
+          <a:srcRect t="55926" r="35185" b="15926"/>
+          <a:stretch/>
+        </p:blipFill>
+        <p:spPr>
+          <a:xfrm>
+            <a:off x="457200" y="2803526"/>
+            <a:ext cx="8200284" cy="1749424"/>
+          </a:xfrm>
+          <a:prstGeom prst="rect">
+            <a:avLst/>
+          </a:prstGeom>
+        </p:spPr>
+      </p:pic>
     </p:spTree>
     <p:extLst>
       <p:ext uri="{BB962C8B-B14F-4D97-AF65-F5344CB8AC3E}">
-        <p14:creationId xmlns:p14="http://schemas.microsoft.com/office/powerpoint/2010/main" val="4037059624"/>
+        <p14:creationId xmlns:p14="http://schemas.microsoft.com/office/powerpoint/2010/main" val="1612021433"/>
       </p:ext>
     </p:extLst>
   </p:cSld>

</xml_diff>